<commit_message>
Update slide của Đạo và slide cuối
</commit_message>
<xml_diff>
--- a/Anh Van/PPT_ThuyetTrinhAnhVan.pptx
+++ b/Anh Van/PPT_ThuyetTrinhAnhVan.pptx
@@ -8737,7 +8737,7 @@
         </p:nvSpPr>
         <p:spPr>
           <a:xfrm>
-            <a:off x="2470149" y="750312"/>
+            <a:off x="-13970" y="3417312"/>
             <a:ext cx="9766085" cy="3046988"/>
           </a:xfrm>
           <a:prstGeom prst="rect">
@@ -8790,56 +8790,32 @@
       </p:sp>
       <p:pic>
         <p:nvPicPr>
-          <p:cNvPr id="22531" name="Picture 2"/>
+          <p:cNvPr id="6" name="Picture 5"/>
           <p:cNvPicPr>
             <a:picLocks noChangeAspect="1"/>
           </p:cNvPicPr>
           <p:nvPr/>
         </p:nvPicPr>
         <p:blipFill>
-          <a:blip r:embed="rId2">
+          <a:blip r:embed="rId2" cstate="print">
             <a:extLst>
               <a:ext uri="{28A0092B-C50C-407E-A947-70E740481C1C}">
                 <a14:useLocalDpi xmlns:a14="http://schemas.microsoft.com/office/drawing/2010/main" val="0"/>
               </a:ext>
             </a:extLst>
           </a:blip>
-          <a:srcRect/>
           <a:stretch>
             <a:fillRect/>
           </a:stretch>
         </p:blipFill>
-        <p:spPr bwMode="auto">
+        <p:spPr>
           <a:xfrm>
-            <a:off x="4619625" y="3797300"/>
-            <a:ext cx="5467350" cy="6143625"/>
+            <a:off x="7346841" y="2959100"/>
+            <a:ext cx="6318359" cy="6782758"/>
           </a:xfrm>
           <a:prstGeom prst="rect">
             <a:avLst/>
           </a:prstGeom>
-          <a:noFill/>
-          <a:ln>
-            <a:noFill/>
-          </a:ln>
-          <a:extLst>
-            <a:ext uri="{909E8E84-426E-40DD-AFC4-6F175D3DCCD1}">
-              <a14:hiddenFill xmlns:a14="http://schemas.microsoft.com/office/drawing/2010/main">
-                <a:solidFill>
-                  <a:srgbClr val="FFFFFF"/>
-                </a:solidFill>
-              </a14:hiddenFill>
-            </a:ext>
-            <a:ext uri="{91240B29-F687-4F45-9708-019B960494DF}">
-              <a14:hiddenLine xmlns:a14="http://schemas.microsoft.com/office/drawing/2010/main" w="9525">
-                <a:solidFill>
-                  <a:srgbClr val="000000"/>
-                </a:solidFill>
-                <a:miter lim="800000"/>
-                <a:headEnd/>
-                <a:tailEnd/>
-              </a14:hiddenLine>
-            </a:ext>
-          </a:extLst>
         </p:spPr>
       </p:pic>
     </p:spTree>
@@ -9820,7 +9796,7 @@
               <a:buFont typeface="Arial" panose="020B0604020202020204" pitchFamily="34" charset="0"/>
               <a:buNone/>
             </a:pPr>
-            <a:endParaRPr lang="en-US" sz="5400" smtClean="0">
+            <a:endParaRPr lang="en-US" sz="5400" dirty="0" smtClean="0">
               <a:cs typeface="Arial" panose="020B0604020202020204" pitchFamily="34" charset="0"/>
             </a:endParaRPr>
           </a:p>
@@ -9833,13 +9809,13 @@
               <a:buNone/>
             </a:pPr>
             <a:r>
-              <a:rPr lang="en-US" sz="4800" smtClean="0">
+              <a:rPr lang="en-US" sz="4800" dirty="0" smtClean="0">
                 <a:cs typeface="Arial" panose="020B0604020202020204" pitchFamily="34" charset="0"/>
               </a:rPr>
               <a:t>What is the </a:t>
             </a:r>
             <a:r>
-              <a:rPr lang="en-US" sz="4800" smtClean="0">
+              <a:rPr lang="en-US" sz="4800" dirty="0" smtClean="0">
                 <a:latin typeface="Arial" panose="020B0604020202020204" pitchFamily="34" charset="0"/>
                 <a:cs typeface="Arial" panose="020B0604020202020204" pitchFamily="34" charset="0"/>
               </a:rPr>
@@ -9855,12 +9831,12 @@
               <a:buNone/>
             </a:pPr>
             <a:r>
-              <a:rPr lang="en-US" sz="4800" smtClean="0">
+              <a:rPr lang="en-US" sz="4800" dirty="0" smtClean="0">
                 <a:cs typeface="Arial" panose="020B0604020202020204" pitchFamily="34" charset="0"/>
               </a:rPr>
               <a:t>Direct measurement' refers to measuring exactly the thing that you're looking to measure.</a:t>
             </a:r>
-            <a:endParaRPr lang="vi-VN" sz="4800" smtClean="0">
+            <a:endParaRPr lang="vi-VN" sz="4800" dirty="0" smtClean="0">
               <a:cs typeface="Arial" panose="020B0604020202020204" pitchFamily="34" charset="0"/>
             </a:endParaRPr>
           </a:p>
@@ -9975,7 +9951,7 @@
                                     </p:set>
                                     <p:animEffect transition="in" filter="circle(in)">
                                       <p:cBhvr>
-                                        <p:cTn id="7" dur="2000"/>
+                                        <p:cTn id="7" dur="1000"/>
                                         <p:tgtEl>
                                           <p:spTgt spid="4099">
                                             <p:txEl>
@@ -10036,7 +10012,7 @@
                                     </p:set>
                                     <p:animEffect transition="in" filter="circle(in)">
                                       <p:cBhvr>
-                                        <p:cTn id="12" dur="2000"/>
+                                        <p:cTn id="12" dur="1000"/>
                                         <p:tgtEl>
                                           <p:spTgt spid="4099">
                                             <p:txEl>
@@ -10151,6 +10127,198 @@
           </a:extLst>
         </p:spPr>
       </p:pic>
+      <p:sp>
+        <p:nvSpPr>
+          <p:cNvPr id="2" name="Rectangle 1"/>
+          <p:cNvSpPr/>
+          <p:nvPr/>
+        </p:nvSpPr>
+        <p:spPr>
+          <a:xfrm>
+            <a:off x="1327150" y="2044700"/>
+            <a:ext cx="10439400" cy="1447800"/>
+          </a:xfrm>
+          <a:prstGeom prst="rect">
+            <a:avLst/>
+          </a:prstGeom>
+          <a:solidFill>
+            <a:schemeClr val="bg1"/>
+          </a:solidFill>
+          <a:ln>
+            <a:solidFill>
+              <a:schemeClr val="bg1"/>
+            </a:solidFill>
+          </a:ln>
+        </p:spPr>
+        <p:style>
+          <a:lnRef idx="2">
+            <a:schemeClr val="accent1">
+              <a:shade val="50000"/>
+            </a:schemeClr>
+          </a:lnRef>
+          <a:fillRef idx="1">
+            <a:schemeClr val="accent1"/>
+          </a:fillRef>
+          <a:effectRef idx="0">
+            <a:schemeClr val="accent1"/>
+          </a:effectRef>
+          <a:fontRef idx="minor">
+            <a:schemeClr val="lt1"/>
+          </a:fontRef>
+        </p:style>
+        <p:txBody>
+          <a:bodyPr rtlCol="0" anchor="ctr"/>
+          <a:lstStyle/>
+          <a:p>
+            <a:pPr algn="ctr"/>
+            <a:endParaRPr lang="vi-VN"/>
+          </a:p>
+        </p:txBody>
+      </p:sp>
+      <p:sp>
+        <p:nvSpPr>
+          <p:cNvPr id="4" name="Rectangle 3"/>
+          <p:cNvSpPr/>
+          <p:nvPr/>
+        </p:nvSpPr>
+        <p:spPr>
+          <a:xfrm>
+            <a:off x="1313180" y="3672840"/>
+            <a:ext cx="10439400" cy="1447800"/>
+          </a:xfrm>
+          <a:prstGeom prst="rect">
+            <a:avLst/>
+          </a:prstGeom>
+          <a:solidFill>
+            <a:schemeClr val="bg1"/>
+          </a:solidFill>
+          <a:ln>
+            <a:solidFill>
+              <a:schemeClr val="bg1"/>
+            </a:solidFill>
+          </a:ln>
+        </p:spPr>
+        <p:style>
+          <a:lnRef idx="2">
+            <a:schemeClr val="accent1">
+              <a:shade val="50000"/>
+            </a:schemeClr>
+          </a:lnRef>
+          <a:fillRef idx="1">
+            <a:schemeClr val="accent1"/>
+          </a:fillRef>
+          <a:effectRef idx="0">
+            <a:schemeClr val="accent1"/>
+          </a:effectRef>
+          <a:fontRef idx="minor">
+            <a:schemeClr val="lt1"/>
+          </a:fontRef>
+        </p:style>
+        <p:txBody>
+          <a:bodyPr rtlCol="0" anchor="ctr"/>
+          <a:lstStyle/>
+          <a:p>
+            <a:pPr algn="ctr"/>
+            <a:endParaRPr lang="vi-VN"/>
+          </a:p>
+        </p:txBody>
+      </p:sp>
+      <p:sp>
+        <p:nvSpPr>
+          <p:cNvPr id="5" name="Rectangle 4"/>
+          <p:cNvSpPr/>
+          <p:nvPr/>
+        </p:nvSpPr>
+        <p:spPr>
+          <a:xfrm>
+            <a:off x="1327150" y="5059680"/>
+            <a:ext cx="11353800" cy="1447800"/>
+          </a:xfrm>
+          <a:prstGeom prst="rect">
+            <a:avLst/>
+          </a:prstGeom>
+          <a:solidFill>
+            <a:schemeClr val="bg1"/>
+          </a:solidFill>
+          <a:ln>
+            <a:solidFill>
+              <a:schemeClr val="bg1"/>
+            </a:solidFill>
+          </a:ln>
+        </p:spPr>
+        <p:style>
+          <a:lnRef idx="2">
+            <a:schemeClr val="accent1">
+              <a:shade val="50000"/>
+            </a:schemeClr>
+          </a:lnRef>
+          <a:fillRef idx="1">
+            <a:schemeClr val="accent1"/>
+          </a:fillRef>
+          <a:effectRef idx="0">
+            <a:schemeClr val="accent1"/>
+          </a:effectRef>
+          <a:fontRef idx="minor">
+            <a:schemeClr val="lt1"/>
+          </a:fontRef>
+        </p:style>
+        <p:txBody>
+          <a:bodyPr rtlCol="0" anchor="ctr"/>
+          <a:lstStyle/>
+          <a:p>
+            <a:pPr algn="ctr"/>
+            <a:endParaRPr lang="vi-VN"/>
+          </a:p>
+        </p:txBody>
+      </p:sp>
+      <p:sp>
+        <p:nvSpPr>
+          <p:cNvPr id="6" name="Rectangle 5"/>
+          <p:cNvSpPr/>
+          <p:nvPr/>
+        </p:nvSpPr>
+        <p:spPr>
+          <a:xfrm>
+            <a:off x="1336040" y="6667500"/>
+            <a:ext cx="11353800" cy="1447800"/>
+          </a:xfrm>
+          <a:prstGeom prst="rect">
+            <a:avLst/>
+          </a:prstGeom>
+          <a:solidFill>
+            <a:schemeClr val="bg1"/>
+          </a:solidFill>
+          <a:ln>
+            <a:solidFill>
+              <a:schemeClr val="bg1"/>
+            </a:solidFill>
+          </a:ln>
+        </p:spPr>
+        <p:style>
+          <a:lnRef idx="2">
+            <a:schemeClr val="accent1">
+              <a:shade val="50000"/>
+            </a:schemeClr>
+          </a:lnRef>
+          <a:fillRef idx="1">
+            <a:schemeClr val="accent1"/>
+          </a:fillRef>
+          <a:effectRef idx="0">
+            <a:schemeClr val="accent1"/>
+          </a:effectRef>
+          <a:fontRef idx="minor">
+            <a:schemeClr val="lt1"/>
+          </a:fontRef>
+        </p:style>
+        <p:txBody>
+          <a:bodyPr rtlCol="0" anchor="ctr"/>
+          <a:lstStyle/>
+          <a:p>
+            <a:pPr algn="ctr"/>
+            <a:endParaRPr lang="vi-VN"/>
+          </a:p>
+        </p:txBody>
+      </p:sp>
     </p:spTree>
   </p:cSld>
   <p:clrMapOvr>
@@ -10159,9 +10327,250 @@
   <p:timing>
     <p:tnLst>
       <p:par>
-        <p:cTn id="1" dur="indefinite" restart="never" nodeType="tmRoot"/>
+        <p:cTn id="1" dur="indefinite" restart="never" nodeType="tmRoot">
+          <p:childTnLst>
+            <p:seq concurrent="1" nextAc="seek">
+              <p:cTn id="2" dur="indefinite" nodeType="mainSeq">
+                <p:childTnLst>
+                  <p:par>
+                    <p:cTn id="3" fill="hold">
+                      <p:stCondLst>
+                        <p:cond delay="indefinite"/>
+                      </p:stCondLst>
+                      <p:childTnLst>
+                        <p:par>
+                          <p:cTn id="4" fill="hold">
+                            <p:stCondLst>
+                              <p:cond delay="0"/>
+                            </p:stCondLst>
+                            <p:childTnLst>
+                              <p:par>
+                                <p:cTn id="5" presetID="10" presetClass="exit" presetSubtype="0" fill="hold" grpId="0" nodeType="clickEffect">
+                                  <p:stCondLst>
+                                    <p:cond delay="0"/>
+                                  </p:stCondLst>
+                                  <p:childTnLst>
+                                    <p:animEffect transition="out" filter="fade">
+                                      <p:cBhvr>
+                                        <p:cTn id="6" dur="500"/>
+                                        <p:tgtEl>
+                                          <p:spTgt spid="2"/>
+                                        </p:tgtEl>
+                                      </p:cBhvr>
+                                    </p:animEffect>
+                                    <p:set>
+                                      <p:cBhvr>
+                                        <p:cTn id="7" dur="1" fill="hold">
+                                          <p:stCondLst>
+                                            <p:cond delay="499"/>
+                                          </p:stCondLst>
+                                        </p:cTn>
+                                        <p:tgtEl>
+                                          <p:spTgt spid="2"/>
+                                        </p:tgtEl>
+                                        <p:attrNameLst>
+                                          <p:attrName>style.visibility</p:attrName>
+                                        </p:attrNameLst>
+                                      </p:cBhvr>
+                                      <p:to>
+                                        <p:strVal val="hidden"/>
+                                      </p:to>
+                                    </p:set>
+                                  </p:childTnLst>
+                                </p:cTn>
+                              </p:par>
+                            </p:childTnLst>
+                          </p:cTn>
+                        </p:par>
+                      </p:childTnLst>
+                    </p:cTn>
+                  </p:par>
+                  <p:par>
+                    <p:cTn id="8" fill="hold">
+                      <p:stCondLst>
+                        <p:cond delay="indefinite"/>
+                      </p:stCondLst>
+                      <p:childTnLst>
+                        <p:par>
+                          <p:cTn id="9" fill="hold">
+                            <p:stCondLst>
+                              <p:cond delay="0"/>
+                            </p:stCondLst>
+                            <p:childTnLst>
+                              <p:par>
+                                <p:cTn id="10" presetID="10" presetClass="exit" presetSubtype="0" fill="hold" grpId="0" nodeType="clickEffect">
+                                  <p:stCondLst>
+                                    <p:cond delay="0"/>
+                                  </p:stCondLst>
+                                  <p:childTnLst>
+                                    <p:animEffect transition="out" filter="fade">
+                                      <p:cBhvr>
+                                        <p:cTn id="11" dur="500"/>
+                                        <p:tgtEl>
+                                          <p:spTgt spid="4"/>
+                                        </p:tgtEl>
+                                      </p:cBhvr>
+                                    </p:animEffect>
+                                    <p:set>
+                                      <p:cBhvr>
+                                        <p:cTn id="12" dur="1" fill="hold">
+                                          <p:stCondLst>
+                                            <p:cond delay="499"/>
+                                          </p:stCondLst>
+                                        </p:cTn>
+                                        <p:tgtEl>
+                                          <p:spTgt spid="4"/>
+                                        </p:tgtEl>
+                                        <p:attrNameLst>
+                                          <p:attrName>style.visibility</p:attrName>
+                                        </p:attrNameLst>
+                                      </p:cBhvr>
+                                      <p:to>
+                                        <p:strVal val="hidden"/>
+                                      </p:to>
+                                    </p:set>
+                                  </p:childTnLst>
+                                </p:cTn>
+                              </p:par>
+                            </p:childTnLst>
+                          </p:cTn>
+                        </p:par>
+                      </p:childTnLst>
+                    </p:cTn>
+                  </p:par>
+                  <p:par>
+                    <p:cTn id="13" fill="hold">
+                      <p:stCondLst>
+                        <p:cond delay="indefinite"/>
+                      </p:stCondLst>
+                      <p:childTnLst>
+                        <p:par>
+                          <p:cTn id="14" fill="hold">
+                            <p:stCondLst>
+                              <p:cond delay="0"/>
+                            </p:stCondLst>
+                            <p:childTnLst>
+                              <p:par>
+                                <p:cTn id="15" presetID="10" presetClass="exit" presetSubtype="0" fill="hold" grpId="0" nodeType="clickEffect">
+                                  <p:stCondLst>
+                                    <p:cond delay="0"/>
+                                  </p:stCondLst>
+                                  <p:childTnLst>
+                                    <p:animEffect transition="out" filter="fade">
+                                      <p:cBhvr>
+                                        <p:cTn id="16" dur="500"/>
+                                        <p:tgtEl>
+                                          <p:spTgt spid="5"/>
+                                        </p:tgtEl>
+                                      </p:cBhvr>
+                                    </p:animEffect>
+                                    <p:set>
+                                      <p:cBhvr>
+                                        <p:cTn id="17" dur="1" fill="hold">
+                                          <p:stCondLst>
+                                            <p:cond delay="499"/>
+                                          </p:stCondLst>
+                                        </p:cTn>
+                                        <p:tgtEl>
+                                          <p:spTgt spid="5"/>
+                                        </p:tgtEl>
+                                        <p:attrNameLst>
+                                          <p:attrName>style.visibility</p:attrName>
+                                        </p:attrNameLst>
+                                      </p:cBhvr>
+                                      <p:to>
+                                        <p:strVal val="hidden"/>
+                                      </p:to>
+                                    </p:set>
+                                  </p:childTnLst>
+                                </p:cTn>
+                              </p:par>
+                            </p:childTnLst>
+                          </p:cTn>
+                        </p:par>
+                      </p:childTnLst>
+                    </p:cTn>
+                  </p:par>
+                  <p:par>
+                    <p:cTn id="18" fill="hold">
+                      <p:stCondLst>
+                        <p:cond delay="indefinite"/>
+                      </p:stCondLst>
+                      <p:childTnLst>
+                        <p:par>
+                          <p:cTn id="19" fill="hold">
+                            <p:stCondLst>
+                              <p:cond delay="0"/>
+                            </p:stCondLst>
+                            <p:childTnLst>
+                              <p:par>
+                                <p:cTn id="20" presetID="10" presetClass="exit" presetSubtype="0" fill="hold" grpId="0" nodeType="clickEffect">
+                                  <p:stCondLst>
+                                    <p:cond delay="0"/>
+                                  </p:stCondLst>
+                                  <p:childTnLst>
+                                    <p:animEffect transition="out" filter="fade">
+                                      <p:cBhvr>
+                                        <p:cTn id="21" dur="500"/>
+                                        <p:tgtEl>
+                                          <p:spTgt spid="6"/>
+                                        </p:tgtEl>
+                                      </p:cBhvr>
+                                    </p:animEffect>
+                                    <p:set>
+                                      <p:cBhvr>
+                                        <p:cTn id="22" dur="1" fill="hold">
+                                          <p:stCondLst>
+                                            <p:cond delay="499"/>
+                                          </p:stCondLst>
+                                        </p:cTn>
+                                        <p:tgtEl>
+                                          <p:spTgt spid="6"/>
+                                        </p:tgtEl>
+                                        <p:attrNameLst>
+                                          <p:attrName>style.visibility</p:attrName>
+                                        </p:attrNameLst>
+                                      </p:cBhvr>
+                                      <p:to>
+                                        <p:strVal val="hidden"/>
+                                      </p:to>
+                                    </p:set>
+                                  </p:childTnLst>
+                                </p:cTn>
+                              </p:par>
+                            </p:childTnLst>
+                          </p:cTn>
+                        </p:par>
+                      </p:childTnLst>
+                    </p:cTn>
+                  </p:par>
+                </p:childTnLst>
+              </p:cTn>
+              <p:prevCondLst>
+                <p:cond evt="onPrev" delay="0">
+                  <p:tgtEl>
+                    <p:sldTgt/>
+                  </p:tgtEl>
+                </p:cond>
+              </p:prevCondLst>
+              <p:nextCondLst>
+                <p:cond evt="onNext" delay="0">
+                  <p:tgtEl>
+                    <p:sldTgt/>
+                  </p:tgtEl>
+                </p:cond>
+              </p:nextCondLst>
+            </p:seq>
+          </p:childTnLst>
+        </p:cTn>
       </p:par>
     </p:tnLst>
+    <p:bldLst>
+      <p:bldP spid="2" grpId="0" animBg="1"/>
+      <p:bldP spid="4" grpId="0" animBg="1"/>
+      <p:bldP spid="5" grpId="0" animBg="1"/>
+      <p:bldP spid="6" grpId="0" animBg="1"/>
+    </p:bldLst>
   </p:timing>
 </p:sld>
 </file>

</xml_diff>

<commit_message>
Update slide thành viên của nhóm
</commit_message>
<xml_diff>
--- a/Anh Van/PPT_ThuyetTrinhAnhVan.pptx
+++ b/Anh Van/PPT_ThuyetTrinhAnhVan.pptx
@@ -5,21 +5,22 @@
     <p:sldMasterId id="2147483648" r:id="rId1"/>
   </p:sldMasterIdLst>
   <p:notesMasterIdLst>
-    <p:notesMasterId r:id="rId14"/>
+    <p:notesMasterId r:id="rId15"/>
   </p:notesMasterIdLst>
   <p:sldIdLst>
     <p:sldId id="285" r:id="rId2"/>
-    <p:sldId id="287" r:id="rId3"/>
-    <p:sldId id="293" r:id="rId4"/>
-    <p:sldId id="288" r:id="rId5"/>
-    <p:sldId id="282" r:id="rId6"/>
-    <p:sldId id="294" r:id="rId7"/>
-    <p:sldId id="289" r:id="rId8"/>
-    <p:sldId id="290" r:id="rId9"/>
-    <p:sldId id="291" r:id="rId10"/>
-    <p:sldId id="286" r:id="rId11"/>
-    <p:sldId id="275" r:id="rId12"/>
-    <p:sldId id="292" r:id="rId13"/>
+    <p:sldId id="296" r:id="rId3"/>
+    <p:sldId id="287" r:id="rId4"/>
+    <p:sldId id="293" r:id="rId5"/>
+    <p:sldId id="288" r:id="rId6"/>
+    <p:sldId id="282" r:id="rId7"/>
+    <p:sldId id="294" r:id="rId8"/>
+    <p:sldId id="289" r:id="rId9"/>
+    <p:sldId id="290" r:id="rId10"/>
+    <p:sldId id="291" r:id="rId11"/>
+    <p:sldId id="286" r:id="rId12"/>
+    <p:sldId id="275" r:id="rId13"/>
+    <p:sldId id="292" r:id="rId14"/>
   </p:sldIdLst>
   <p:sldSz cx="14846300" cy="10490200"/>
   <p:notesSz cx="6858000" cy="9144000"/>
@@ -832,7 +833,7 @@
             <a:fld id="{3586F204-855F-4106-9C59-E90A3B167197}" type="slidenum">
               <a:rPr lang="en-US" smtClean="0"/>
               <a:pPr/>
-              <a:t>3</a:t>
+              <a:t>4</a:t>
             </a:fld>
             <a:endParaRPr lang="en-US" smtClean="0"/>
           </a:p>
@@ -842,6 +843,96 @@
     <p:extLst>
       <p:ext uri="{BB962C8B-B14F-4D97-AF65-F5344CB8AC3E}">
         <p14:creationId xmlns:p14="http://schemas.microsoft.com/office/powerpoint/2010/main" val="2004265151"/>
+      </p:ext>
+    </p:extLst>
+  </p:cSld>
+  <p:clrMapOvr>
+    <a:masterClrMapping/>
+  </p:clrMapOvr>
+</p:notes>
+</file>
+
+<file path=ppt/notesSlides/notesSlide10.xml><?xml version="1.0" encoding="utf-8"?>
+<p:notes xmlns:a="http://schemas.openxmlformats.org/drawingml/2006/main" xmlns:r="http://schemas.openxmlformats.org/officeDocument/2006/relationships" xmlns:p="http://schemas.openxmlformats.org/presentationml/2006/main">
+  <p:cSld>
+    <p:spTree>
+      <p:nvGrpSpPr>
+        <p:cNvPr id="1" name=""/>
+        <p:cNvGrpSpPr/>
+        <p:nvPr/>
+      </p:nvGrpSpPr>
+      <p:grpSpPr>
+        <a:xfrm>
+          <a:off x="0" y="0"/>
+          <a:ext cx="0" cy="0"/>
+          <a:chOff x="0" y="0"/>
+          <a:chExt cx="0" cy="0"/>
+        </a:xfrm>
+      </p:grpSpPr>
+      <p:sp>
+        <p:nvSpPr>
+          <p:cNvPr id="2" name="Slide Image Placeholder 1"/>
+          <p:cNvSpPr>
+            <a:spLocks noGrp="1" noRot="1" noChangeAspect="1"/>
+          </p:cNvSpPr>
+          <p:nvPr>
+            <p:ph type="sldImg"/>
+          </p:nvPr>
+        </p:nvSpPr>
+        <p:spPr/>
+      </p:sp>
+      <p:sp>
+        <p:nvSpPr>
+          <p:cNvPr id="3" name="Notes Placeholder 2"/>
+          <p:cNvSpPr>
+            <a:spLocks noGrp="1"/>
+          </p:cNvSpPr>
+          <p:nvPr>
+            <p:ph type="body" idx="1"/>
+          </p:nvPr>
+        </p:nvSpPr>
+        <p:spPr/>
+        <p:txBody>
+          <a:bodyPr/>
+          <a:lstStyle/>
+          <a:p>
+            <a:endParaRPr lang="vi-VN" dirty="0"/>
+          </a:p>
+        </p:txBody>
+      </p:sp>
+      <p:sp>
+        <p:nvSpPr>
+          <p:cNvPr id="4" name="Slide Number Placeholder 3"/>
+          <p:cNvSpPr>
+            <a:spLocks noGrp="1"/>
+          </p:cNvSpPr>
+          <p:nvPr>
+            <p:ph type="sldNum" sz="quarter" idx="10"/>
+          </p:nvPr>
+        </p:nvSpPr>
+        <p:spPr/>
+        <p:txBody>
+          <a:bodyPr/>
+          <a:lstStyle/>
+          <a:p>
+            <a:pPr>
+              <a:defRPr/>
+            </a:pPr>
+            <a:fld id="{42252463-4A8C-4631-A1CF-A68935360D18}" type="slidenum">
+              <a:rPr lang="en-US" smtClean="0"/>
+              <a:pPr>
+                <a:defRPr/>
+              </a:pPr>
+              <a:t>13</a:t>
+            </a:fld>
+            <a:endParaRPr lang="en-US"/>
+          </a:p>
+        </p:txBody>
+      </p:sp>
+    </p:spTree>
+    <p:extLst>
+      <p:ext uri="{BB962C8B-B14F-4D97-AF65-F5344CB8AC3E}">
+        <p14:creationId xmlns:p14="http://schemas.microsoft.com/office/powerpoint/2010/main" val="3928081969"/>
       </p:ext>
     </p:extLst>
   </p:cSld>
@@ -1121,7 +1212,7 @@
             <a:fld id="{ABC73214-2576-4AC8-B2B1-3818268607D9}" type="slidenum">
               <a:rPr lang="en-US" smtClean="0"/>
               <a:pPr/>
-              <a:t>4</a:t>
+              <a:t>5</a:t>
             </a:fld>
             <a:endParaRPr lang="en-US" smtClean="0"/>
           </a:p>
@@ -1385,7 +1476,7 @@
             <a:fld id="{B023FDC7-8FDE-4338-B04A-775750B21C51}" type="slidenum">
               <a:rPr lang="en-US" smtClean="0"/>
               <a:pPr/>
-              <a:t>5</a:t>
+              <a:t>6</a:t>
             </a:fld>
             <a:endParaRPr lang="en-US" smtClean="0"/>
           </a:p>
@@ -1649,7 +1740,7 @@
             <a:fld id="{B192E3C8-D3BC-41EF-A05F-8D885F972C97}" type="slidenum">
               <a:rPr lang="en-US" smtClean="0"/>
               <a:pPr/>
-              <a:t>6</a:t>
+              <a:t>7</a:t>
             </a:fld>
             <a:endParaRPr lang="en-US" smtClean="0"/>
           </a:p>
@@ -1756,7 +1847,72 @@
           </a:bodyPr>
           <a:lstStyle/>
           <a:p>
-            <a:endParaRPr lang="vi-VN" smtClean="0">
+            <a:r>
+              <a:rPr lang="en-US" dirty="0" smtClean="0">
+                <a:latin typeface="Calibri" panose="020F0502020204030204" pitchFamily="34" charset="0"/>
+              </a:rPr>
+              <a:t>Hello everyone,</a:t>
+            </a:r>
+            <a:r>
+              <a:rPr lang="en-US" baseline="0" dirty="0" smtClean="0">
+                <a:latin typeface="Calibri" panose="020F0502020204030204" pitchFamily="34" charset="0"/>
+              </a:rPr>
+              <a:t> my name’s </a:t>
+            </a:r>
+            <a:r>
+              <a:rPr lang="en-US" baseline="0" dirty="0" err="1" smtClean="0">
+                <a:latin typeface="Calibri" panose="020F0502020204030204" pitchFamily="34" charset="0"/>
+              </a:rPr>
+              <a:t>Khang</a:t>
+            </a:r>
+            <a:r>
+              <a:rPr lang="en-US" baseline="0" dirty="0" smtClean="0">
+                <a:latin typeface="Calibri" panose="020F0502020204030204" pitchFamily="34" charset="0"/>
+              </a:rPr>
+              <a:t>. Today </a:t>
+            </a:r>
+            <a:r>
+              <a:rPr lang="en-US" baseline="0" dirty="0" err="1" smtClean="0">
+                <a:latin typeface="Calibri" panose="020F0502020204030204" pitchFamily="34" charset="0"/>
+              </a:rPr>
+              <a:t>i’m</a:t>
+            </a:r>
+            <a:r>
+              <a:rPr lang="en-US" baseline="0" dirty="0" smtClean="0">
+                <a:latin typeface="Calibri" panose="020F0502020204030204" pitchFamily="34" charset="0"/>
+              </a:rPr>
+              <a:t> very happy when I’m stand here to tell you something about one of three method .. May be last way to measure</a:t>
+            </a:r>
+          </a:p>
+          <a:p>
+            <a:r>
+              <a:rPr lang="en-US" baseline="0" dirty="0" smtClean="0">
+                <a:latin typeface="Calibri" panose="020F0502020204030204" pitchFamily="34" charset="0"/>
+              </a:rPr>
+              <a:t>Sometimes, you can’t use direct or indirect measure to collect some special data like CS or UO. That’s reason why you need new way, you need other way to measure that </a:t>
+            </a:r>
+          </a:p>
+          <a:p>
+            <a:r>
+              <a:rPr lang="en-US" baseline="0" dirty="0" smtClean="0">
+                <a:latin typeface="Calibri" panose="020F0502020204030204" pitchFamily="34" charset="0"/>
+              </a:rPr>
+              <a:t>things!! </a:t>
+            </a:r>
+            <a:r>
+              <a:rPr lang="en-US" b="1" baseline="0" dirty="0" smtClean="0">
+                <a:latin typeface="Calibri" panose="020F0502020204030204" pitchFamily="34" charset="0"/>
+              </a:rPr>
+              <a:t>And this method so-called “Subjective measure” follow definition it’s  an opinion…</a:t>
+            </a:r>
+          </a:p>
+          <a:p>
+            <a:endParaRPr lang="en-US" baseline="0" dirty="0" smtClean="0">
+              <a:latin typeface="Calibri" panose="020F0502020204030204" pitchFamily="34" charset="0"/>
+            </a:endParaRPr>
+          </a:p>
+          <a:p>
+            <a:endParaRPr lang="en-US" baseline="0" dirty="0" smtClean="0">
               <a:latin typeface="Calibri" panose="020F0502020204030204" pitchFamily="34" charset="0"/>
             </a:endParaRPr>
           </a:p>
@@ -1907,7 +2063,7 @@
             <a:fld id="{04D53C0A-4F18-4855-8AE4-A4C946845E99}" type="slidenum">
               <a:rPr lang="en-US" smtClean="0"/>
               <a:pPr/>
-              <a:t>7</a:t>
+              <a:t>8</a:t>
             </a:fld>
             <a:endParaRPr lang="en-US" smtClean="0"/>
           </a:p>
@@ -1927,6 +2083,171 @@
 </file>
 
 <file path=ppt/notesSlides/notesSlide6.xml><?xml version="1.0" encoding="utf-8"?>
+<p:notes xmlns:a="http://schemas.openxmlformats.org/drawingml/2006/main" xmlns:r="http://schemas.openxmlformats.org/officeDocument/2006/relationships" xmlns:p="http://schemas.openxmlformats.org/presentationml/2006/main">
+  <p:cSld>
+    <p:spTree>
+      <p:nvGrpSpPr>
+        <p:cNvPr id="1" name=""/>
+        <p:cNvGrpSpPr/>
+        <p:nvPr/>
+      </p:nvGrpSpPr>
+      <p:grpSpPr>
+        <a:xfrm>
+          <a:off x="0" y="0"/>
+          <a:ext cx="0" cy="0"/>
+          <a:chOff x="0" y="0"/>
+          <a:chExt cx="0" cy="0"/>
+        </a:xfrm>
+      </p:grpSpPr>
+      <p:sp>
+        <p:nvSpPr>
+          <p:cNvPr id="2" name="Slide Image Placeholder 1"/>
+          <p:cNvSpPr>
+            <a:spLocks noGrp="1" noRot="1" noChangeAspect="1"/>
+          </p:cNvSpPr>
+          <p:nvPr>
+            <p:ph type="sldImg"/>
+          </p:nvPr>
+        </p:nvSpPr>
+        <p:spPr/>
+      </p:sp>
+      <p:sp>
+        <p:nvSpPr>
+          <p:cNvPr id="3" name="Notes Placeholder 2"/>
+          <p:cNvSpPr>
+            <a:spLocks noGrp="1"/>
+          </p:cNvSpPr>
+          <p:nvPr>
+            <p:ph type="body" idx="1"/>
+          </p:nvPr>
+        </p:nvSpPr>
+        <p:spPr/>
+        <p:txBody>
+          <a:bodyPr/>
+          <a:lstStyle/>
+          <a:p>
+            <a:r>
+              <a:rPr lang="en-US" dirty="0" smtClean="0"/>
+              <a:t>So,</a:t>
+            </a:r>
+            <a:r>
+              <a:rPr lang="en-US" baseline="0" dirty="0" smtClean="0"/>
+              <a:t> why..</a:t>
+            </a:r>
+          </a:p>
+          <a:p>
+            <a:r>
+              <a:rPr lang="en-US" baseline="0" dirty="0" smtClean="0"/>
+              <a:t>A lot of reason..</a:t>
+            </a:r>
+          </a:p>
+          <a:p>
+            <a:r>
+              <a:rPr lang="en-US" baseline="0" dirty="0" smtClean="0"/>
+              <a:t>Some obvious …</a:t>
+            </a:r>
+          </a:p>
+          <a:p>
+            <a:r>
+              <a:rPr lang="en-US" baseline="0" dirty="0" smtClean="0"/>
+              <a:t>You can assess, you can review your current and improve your process</a:t>
+            </a:r>
+          </a:p>
+          <a:p>
+            <a:r>
+              <a:rPr lang="en-US" baseline="0" dirty="0" smtClean="0"/>
+              <a:t>To increase profits, increase </a:t>
+            </a:r>
+            <a:r>
+              <a:rPr lang="en-US" b="1" baseline="0" dirty="0" smtClean="0"/>
+              <a:t>business value. Of course, if you increase your customer satisfaction </a:t>
+            </a:r>
+            <a:r>
+              <a:rPr lang="en-US" b="1" baseline="0" dirty="0" err="1" smtClean="0"/>
+              <a:t>frist</a:t>
+            </a:r>
+            <a:r>
+              <a:rPr lang="en-US" b="1" baseline="0" dirty="0" smtClean="0"/>
+              <a:t>!!!!</a:t>
+            </a:r>
+          </a:p>
+          <a:p>
+            <a:endParaRPr lang="en-US" dirty="0" smtClean="0"/>
+          </a:p>
+          <a:p>
+            <a:r>
+              <a:rPr lang="en-US" b="1" dirty="0" smtClean="0"/>
+              <a:t>When</a:t>
+            </a:r>
+            <a:r>
+              <a:rPr lang="en-US" b="1" baseline="0" dirty="0" smtClean="0"/>
+              <a:t> you measure that 2 things,</a:t>
+            </a:r>
+            <a:r>
+              <a:rPr lang="en-US" baseline="0" dirty="0" smtClean="0"/>
+              <a:t> you should apply some tools, into this method to increase effective to measure… survey, liker scale.</a:t>
+            </a:r>
+          </a:p>
+          <a:p>
+            <a:endParaRPr lang="en-US" baseline="0" dirty="0" smtClean="0"/>
+          </a:p>
+          <a:p>
+            <a:r>
+              <a:rPr lang="en-US" baseline="0" dirty="0" smtClean="0"/>
+              <a:t>With 5 level, you can get some information from customer mind to improve your current.</a:t>
+            </a:r>
+          </a:p>
+          <a:p>
+            <a:endParaRPr lang="en-US" baseline="0" dirty="0" smtClean="0"/>
+          </a:p>
+          <a:p>
+            <a:endParaRPr lang="en-US" baseline="0" dirty="0" smtClean="0"/>
+          </a:p>
+        </p:txBody>
+      </p:sp>
+      <p:sp>
+        <p:nvSpPr>
+          <p:cNvPr id="4" name="Slide Number Placeholder 3"/>
+          <p:cNvSpPr>
+            <a:spLocks noGrp="1"/>
+          </p:cNvSpPr>
+          <p:nvPr>
+            <p:ph type="sldNum" sz="quarter" idx="10"/>
+          </p:nvPr>
+        </p:nvSpPr>
+        <p:spPr/>
+        <p:txBody>
+          <a:bodyPr/>
+          <a:lstStyle/>
+          <a:p>
+            <a:pPr>
+              <a:defRPr/>
+            </a:pPr>
+            <a:fld id="{42252463-4A8C-4631-A1CF-A68935360D18}" type="slidenum">
+              <a:rPr lang="en-US" smtClean="0"/>
+              <a:pPr>
+                <a:defRPr/>
+              </a:pPr>
+              <a:t>9</a:t>
+            </a:fld>
+            <a:endParaRPr lang="en-US"/>
+          </a:p>
+        </p:txBody>
+      </p:sp>
+    </p:spTree>
+    <p:extLst>
+      <p:ext uri="{BB962C8B-B14F-4D97-AF65-F5344CB8AC3E}">
+        <p14:creationId xmlns:p14="http://schemas.microsoft.com/office/powerpoint/2010/main" val="2723884358"/>
+      </p:ext>
+    </p:extLst>
+  </p:cSld>
+  <p:clrMapOvr>
+    <a:masterClrMapping/>
+  </p:clrMapOvr>
+</p:notes>
+</file>
+
+<file path=ppt/notesSlides/notesSlide7.xml><?xml version="1.0" encoding="utf-8"?>
 <p:notes xmlns:a="http://schemas.openxmlformats.org/drawingml/2006/main" xmlns:r="http://schemas.openxmlformats.org/officeDocument/2006/relationships" xmlns:p="http://schemas.openxmlformats.org/presentationml/2006/main">
   <p:cSld>
     <p:spTree>
@@ -2014,7 +2335,19 @@
           </a:bodyPr>
           <a:lstStyle/>
           <a:p>
-            <a:endParaRPr lang="vi-VN" smtClean="0">
+            <a:r>
+              <a:rPr lang="en-US" dirty="0" smtClean="0">
+                <a:latin typeface="Calibri" panose="020F0502020204030204" pitchFamily="34" charset="0"/>
+              </a:rPr>
+              <a:t>Finally</a:t>
+            </a:r>
+            <a:r>
+              <a:rPr lang="en-US" baseline="0" dirty="0" smtClean="0">
+                <a:latin typeface="Calibri" panose="020F0502020204030204" pitchFamily="34" charset="0"/>
+              </a:rPr>
+              <a:t>, you must remember that…</a:t>
+            </a:r>
+            <a:endParaRPr lang="vi-VN" dirty="0" smtClean="0">
               <a:latin typeface="Calibri" panose="020F0502020204030204" pitchFamily="34" charset="0"/>
             </a:endParaRPr>
           </a:p>
@@ -2165,7 +2498,7 @@
             <a:fld id="{3EA9C7C3-B3F2-4E0F-9D96-5FCBD56A4FD8}" type="slidenum">
               <a:rPr lang="en-US" smtClean="0"/>
               <a:pPr/>
-              <a:t>9</a:t>
+              <a:t>10</a:t>
             </a:fld>
             <a:endParaRPr lang="en-US" smtClean="0"/>
           </a:p>
@@ -2184,7 +2517,7 @@
 </p:notes>
 </file>
 
-<file path=ppt/notesSlides/notesSlide7.xml><?xml version="1.0" encoding="utf-8"?>
+<file path=ppt/notesSlides/notesSlide8.xml><?xml version="1.0" encoding="utf-8"?>
 <p:notes xmlns:a="http://schemas.openxmlformats.org/drawingml/2006/main" xmlns:r="http://schemas.openxmlformats.org/officeDocument/2006/relationships" xmlns:p="http://schemas.openxmlformats.org/presentationml/2006/main">
   <p:cSld>
     <p:spTree>
@@ -2425,7 +2758,7 @@
             <a:fld id="{4134B935-FA27-4377-AB2B-BADBC3A9F4B7}" type="slidenum">
               <a:rPr lang="en-US" smtClean="0"/>
               <a:pPr/>
-              <a:t>10</a:t>
+              <a:t>11</a:t>
             </a:fld>
             <a:endParaRPr lang="en-US" smtClean="0"/>
           </a:p>
@@ -2444,7 +2777,7 @@
 </p:notes>
 </file>
 
-<file path=ppt/notesSlides/notesSlide8.xml><?xml version="1.0" encoding="utf-8"?>
+<file path=ppt/notesSlides/notesSlide9.xml><?xml version="1.0" encoding="utf-8"?>
 <p:notes xmlns:a="http://schemas.openxmlformats.org/drawingml/2006/main" xmlns:r="http://schemas.openxmlformats.org/officeDocument/2006/relationships" xmlns:p="http://schemas.openxmlformats.org/presentationml/2006/main">
   <p:cSld>
     <p:spTree>
@@ -2688,7 +3021,7 @@
             <a:fld id="{92D03269-7715-41F8-A597-E34A8080CD8A}" type="slidenum">
               <a:rPr lang="en-US" smtClean="0"/>
               <a:pPr/>
-              <a:t>11</a:t>
+              <a:t>12</a:t>
             </a:fld>
             <a:endParaRPr lang="en-US" smtClean="0"/>
           </a:p>
@@ -3377,6 +3710,378 @@
   <p:clrMapOvr>
     <a:masterClrMapping/>
   </p:clrMapOvr>
+</p:sldLayout>
+</file>
+
+<file path=ppt/slideLayouts/slideLayout12.xml><?xml version="1.0" encoding="utf-8"?>
+<p:sldLayout xmlns:a="http://schemas.openxmlformats.org/drawingml/2006/main" xmlns:r="http://schemas.openxmlformats.org/officeDocument/2006/relationships" xmlns:p="http://schemas.openxmlformats.org/presentationml/2006/main">
+  <p:cSld name="Color Block Quote ">
+    <p:spTree>
+      <p:nvGrpSpPr>
+        <p:cNvPr id="1" name=""/>
+        <p:cNvGrpSpPr/>
+        <p:nvPr/>
+      </p:nvGrpSpPr>
+      <p:grpSpPr>
+        <a:xfrm>
+          <a:off x="0" y="0"/>
+          <a:ext cx="0" cy="0"/>
+          <a:chOff x="0" y="0"/>
+          <a:chExt cx="0" cy="0"/>
+        </a:xfrm>
+      </p:grpSpPr>
+      <p:sp>
+        <p:nvSpPr>
+          <p:cNvPr id="2" name="Rectangle 1"/>
+          <p:cNvSpPr/>
+          <p:nvPr userDrawn="1"/>
+        </p:nvSpPr>
+        <p:spPr bwMode="white">
+          <a:xfrm>
+            <a:off x="1" y="1311279"/>
+            <a:ext cx="14846300" cy="7838512"/>
+          </a:xfrm>
+          <a:prstGeom prst="rect">
+            <a:avLst/>
+          </a:prstGeom>
+          <a:solidFill>
+            <a:schemeClr val="accent1"/>
+          </a:solidFill>
+          <a:ln>
+            <a:noFill/>
+            <a:headEnd type="none" w="med" len="med"/>
+            <a:tailEnd type="none" w="med" len="med"/>
+          </a:ln>
+          <a:effectLst/>
+        </p:spPr>
+        <p:style>
+          <a:lnRef idx="1">
+            <a:schemeClr val="accent2"/>
+          </a:lnRef>
+          <a:fillRef idx="3">
+            <a:schemeClr val="accent2"/>
+          </a:fillRef>
+          <a:effectRef idx="2">
+            <a:schemeClr val="accent2"/>
+          </a:effectRef>
+          <a:fontRef idx="minor">
+            <a:schemeClr val="lt1"/>
+          </a:fontRef>
+        </p:style>
+        <p:txBody>
+          <a:bodyPr rot="0" spcFirstLastPara="0" vertOverflow="overflow" horzOverflow="overflow" vert="horz" wrap="square" lIns="55559" tIns="55559" rIns="55559" bIns="55559" numCol="1" spcCol="0" rtlCol="0" fromWordArt="0" anchor="ctr" anchorCtr="0" forceAA="0" compatLnSpc="1">
+            <a:prstTxWarp prst="textNoShape">
+              <a:avLst/>
+            </a:prstTxWarp>
+            <a:noAutofit/>
+          </a:bodyPr>
+          <a:lstStyle/>
+          <a:p>
+            <a:pPr algn="ctr" defTabSz="1110738" fontAlgn="base">
+              <a:spcBef>
+                <a:spcPct val="0"/>
+              </a:spcBef>
+              <a:spcAft>
+                <a:spcPct val="0"/>
+              </a:spcAft>
+            </a:pPr>
+            <a:endParaRPr lang="en-US" sz="2754" dirty="0" smtClean="0">
+              <a:gradFill>
+                <a:gsLst>
+                  <a:gs pos="0">
+                    <a:srgbClr val="FFFFFF"/>
+                  </a:gs>
+                  <a:gs pos="100000">
+                    <a:srgbClr val="FFFFFF"/>
+                  </a:gs>
+                </a:gsLst>
+                <a:lin ang="5400000" scaled="0"/>
+              </a:gradFill>
+              <a:ea typeface="Segoe UI" pitchFamily="34" charset="0"/>
+              <a:cs typeface="Segoe UI" pitchFamily="34" charset="0"/>
+            </a:endParaRPr>
+          </a:p>
+        </p:txBody>
+      </p:sp>
+      <p:sp>
+        <p:nvSpPr>
+          <p:cNvPr id="5" name="Content Placeholder 4"/>
+          <p:cNvSpPr>
+            <a:spLocks noGrp="1"/>
+          </p:cNvSpPr>
+          <p:nvPr>
+            <p:ph sz="quarter" idx="11" hasCustomPrompt="1"/>
+          </p:nvPr>
+        </p:nvSpPr>
+        <p:spPr>
+          <a:xfrm>
+            <a:off x="634228" y="2077325"/>
+            <a:ext cx="13583651" cy="4379441"/>
+          </a:xfrm>
+          <a:prstGeom prst="rect">
+            <a:avLst/>
+          </a:prstGeom>
+        </p:spPr>
+        <p:txBody>
+          <a:bodyPr>
+            <a:normAutofit/>
+          </a:bodyPr>
+          <a:lstStyle>
+            <a:lvl1pPr marL="0" indent="0">
+              <a:lnSpc>
+                <a:spcPct val="90000"/>
+              </a:lnSpc>
+              <a:buNone/>
+              <a:defRPr sz="7776">
+                <a:gradFill>
+                  <a:gsLst>
+                    <a:gs pos="100000">
+                      <a:schemeClr val="bg1"/>
+                    </a:gs>
+                    <a:gs pos="0">
+                      <a:schemeClr val="bg1"/>
+                    </a:gs>
+                  </a:gsLst>
+                  <a:lin ang="5400000" scaled="0"/>
+                </a:gradFill>
+                <a:latin typeface="+mj-lt"/>
+              </a:defRPr>
+            </a:lvl1pPr>
+            <a:lvl2pPr>
+              <a:defRPr sz="7776">
+                <a:solidFill>
+                  <a:schemeClr val="tx2"/>
+                </a:solidFill>
+                <a:latin typeface="+mn-lt"/>
+              </a:defRPr>
+            </a:lvl2pPr>
+          </a:lstStyle>
+          <a:p>
+            <a:pPr lvl="0"/>
+            <a:r>
+              <a:rPr lang="en-US" dirty="0" smtClean="0"/>
+              <a:t>“Click to edit Master text styles”</a:t>
+            </a:r>
+          </a:p>
+        </p:txBody>
+      </p:sp>
+      <p:sp>
+        <p:nvSpPr>
+          <p:cNvPr id="10" name="Slide Number Placeholder 9"/>
+          <p:cNvSpPr>
+            <a:spLocks noGrp="1"/>
+          </p:cNvSpPr>
+          <p:nvPr>
+            <p:ph type="sldNum" sz="quarter" idx="12"/>
+          </p:nvPr>
+        </p:nvSpPr>
+        <p:spPr>
+          <a:xfrm>
+            <a:off x="634228" y="9788952"/>
+            <a:ext cx="682930" cy="335686"/>
+          </a:xfrm>
+          <a:prstGeom prst="rect">
+            <a:avLst/>
+          </a:prstGeom>
+        </p:spPr>
+        <p:txBody>
+          <a:bodyPr lIns="91436" tIns="45718" rIns="91436" bIns="45718" anchor="ctr"/>
+          <a:lstStyle>
+            <a:lvl1pPr algn="l">
+              <a:defRPr sz="1944">
+                <a:gradFill>
+                  <a:gsLst>
+                    <a:gs pos="100000">
+                      <a:schemeClr val="bg2"/>
+                    </a:gs>
+                    <a:gs pos="0">
+                      <a:schemeClr val="bg2"/>
+                    </a:gs>
+                  </a:gsLst>
+                  <a:lin ang="5400000" scaled="0"/>
+                </a:gradFill>
+              </a:defRPr>
+            </a:lvl1pPr>
+          </a:lstStyle>
+          <a:p>
+            <a:pPr defTabSz="1111058"/>
+            <a:fld id="{727B4C2D-45E2-4621-8491-2995EB46A674}" type="slidenum">
+              <a:rPr lang="en-US" smtClean="0">
+                <a:gradFill>
+                  <a:gsLst>
+                    <a:gs pos="100000">
+                      <a:srgbClr val="797A7D"/>
+                    </a:gs>
+                    <a:gs pos="0">
+                      <a:srgbClr val="797A7D"/>
+                    </a:gs>
+                  </a:gsLst>
+                  <a:lin ang="5400000" scaled="0"/>
+                </a:gradFill>
+              </a:rPr>
+              <a:pPr defTabSz="1111058"/>
+              <a:t>‹#›</a:t>
+            </a:fld>
+            <a:endParaRPr lang="en-US" dirty="0">
+              <a:gradFill>
+                <a:gsLst>
+                  <a:gs pos="100000">
+                    <a:srgbClr val="797A7D"/>
+                  </a:gs>
+                  <a:gs pos="0">
+                    <a:srgbClr val="797A7D"/>
+                  </a:gs>
+                </a:gsLst>
+                <a:lin ang="5400000" scaled="0"/>
+              </a:gradFill>
+            </a:endParaRPr>
+          </a:p>
+        </p:txBody>
+      </p:sp>
+      <p:sp>
+        <p:nvSpPr>
+          <p:cNvPr id="11" name="Content Placeholder 4"/>
+          <p:cNvSpPr>
+            <a:spLocks noGrp="1"/>
+          </p:cNvSpPr>
+          <p:nvPr>
+            <p:ph sz="quarter" idx="13"/>
+          </p:nvPr>
+        </p:nvSpPr>
+        <p:spPr>
+          <a:xfrm>
+            <a:off x="634228" y="6643800"/>
+            <a:ext cx="13583651" cy="720069"/>
+          </a:xfrm>
+          <a:prstGeom prst="rect">
+            <a:avLst/>
+          </a:prstGeom>
+        </p:spPr>
+        <p:txBody>
+          <a:bodyPr>
+            <a:normAutofit/>
+          </a:bodyPr>
+          <a:lstStyle>
+            <a:lvl1pPr marL="0" indent="0">
+              <a:lnSpc>
+                <a:spcPct val="90000"/>
+              </a:lnSpc>
+              <a:buNone/>
+              <a:defRPr sz="4374">
+                <a:gradFill>
+                  <a:gsLst>
+                    <a:gs pos="100000">
+                      <a:schemeClr val="bg1"/>
+                    </a:gs>
+                    <a:gs pos="0">
+                      <a:schemeClr val="bg1"/>
+                    </a:gs>
+                  </a:gsLst>
+                  <a:lin ang="5400000" scaled="0"/>
+                </a:gradFill>
+                <a:latin typeface="+mj-lt"/>
+              </a:defRPr>
+            </a:lvl1pPr>
+            <a:lvl2pPr>
+              <a:defRPr sz="7776">
+                <a:solidFill>
+                  <a:schemeClr val="tx2"/>
+                </a:solidFill>
+                <a:latin typeface="+mn-lt"/>
+              </a:defRPr>
+            </a:lvl2pPr>
+          </a:lstStyle>
+          <a:p>
+            <a:pPr lvl="0"/>
+            <a:r>
+              <a:rPr lang="en-US" smtClean="0"/>
+              <a:t>Click to edit Master text styles</a:t>
+            </a:r>
+          </a:p>
+        </p:txBody>
+      </p:sp>
+      <p:sp>
+        <p:nvSpPr>
+          <p:cNvPr id="8" name="Rectangle 7"/>
+          <p:cNvSpPr/>
+          <p:nvPr userDrawn="1"/>
+        </p:nvSpPr>
+        <p:spPr bwMode="auto">
+          <a:xfrm>
+            <a:off x="12007279" y="9149786"/>
+            <a:ext cx="1410115" cy="1102153"/>
+          </a:xfrm>
+          <a:prstGeom prst="rect">
+            <a:avLst/>
+          </a:prstGeom>
+          <a:solidFill>
+            <a:schemeClr val="bg1"/>
+          </a:solidFill>
+          <a:ln>
+            <a:noFill/>
+            <a:headEnd type="none" w="med" len="med"/>
+            <a:tailEnd type="none" w="med" len="med"/>
+          </a:ln>
+          <a:effectLst/>
+        </p:spPr>
+        <p:style>
+          <a:lnRef idx="1">
+            <a:schemeClr val="accent2"/>
+          </a:lnRef>
+          <a:fillRef idx="3">
+            <a:schemeClr val="accent2"/>
+          </a:fillRef>
+          <a:effectRef idx="2">
+            <a:schemeClr val="accent2"/>
+          </a:effectRef>
+          <a:fontRef idx="minor">
+            <a:schemeClr val="lt1"/>
+          </a:fontRef>
+        </p:style>
+        <p:txBody>
+          <a:bodyPr rot="0" spcFirstLastPara="0" vertOverflow="overflow" horzOverflow="overflow" vert="horz" wrap="square" lIns="55559" tIns="55559" rIns="55559" bIns="55559" numCol="1" spcCol="0" rtlCol="0" fromWordArt="0" anchor="ctr" anchorCtr="0" forceAA="0" compatLnSpc="1">
+            <a:prstTxWarp prst="textNoShape">
+              <a:avLst/>
+            </a:prstTxWarp>
+            <a:noAutofit/>
+          </a:bodyPr>
+          <a:lstStyle/>
+          <a:p>
+            <a:pPr algn="ctr" defTabSz="1110738" fontAlgn="base">
+              <a:spcBef>
+                <a:spcPct val="0"/>
+              </a:spcBef>
+              <a:spcAft>
+                <a:spcPct val="0"/>
+              </a:spcAft>
+            </a:pPr>
+            <a:endParaRPr lang="en-US" sz="2754" dirty="0" smtClean="0">
+              <a:solidFill>
+                <a:srgbClr val="FFFFFF"/>
+              </a:solidFill>
+              <a:ea typeface="Segoe UI" pitchFamily="34" charset="0"/>
+              <a:cs typeface="Segoe UI" pitchFamily="34" charset="0"/>
+            </a:endParaRPr>
+          </a:p>
+        </p:txBody>
+      </p:sp>
+    </p:spTree>
+    <p:extLst>
+      <p:ext uri="{BB962C8B-B14F-4D97-AF65-F5344CB8AC3E}">
+        <p14:creationId xmlns:p14="http://schemas.microsoft.com/office/powerpoint/2010/main" val="4115387625"/>
+      </p:ext>
+    </p:extLst>
+  </p:cSld>
+  <p:clrMapOvr>
+    <a:masterClrMapping/>
+  </p:clrMapOvr>
+  <p:timing>
+    <p:tnLst>
+      <p:par>
+        <p:cTn id="1" dur="indefinite" restart="never" nodeType="tmRoot"/>
+      </p:par>
+    </p:tnLst>
+  </p:timing>
 </p:sldLayout>
 </file>
 
@@ -5796,6 +6501,7 @@
     <p:sldLayoutId id="2147483657" r:id="rId9"/>
     <p:sldLayoutId id="2147483658" r:id="rId10"/>
     <p:sldLayoutId id="2147483659" r:id="rId11"/>
+    <p:sldLayoutId id="2147483660" r:id="rId12"/>
   </p:sldLayoutIdLst>
   <p:txStyles>
     <p:titleStyle>
@@ -6266,6 +6972,514 @@
 </file>
 
 <file path=ppt/slides/slide10.xml><?xml version="1.0" encoding="utf-8"?>
+<p:sld xmlns:a="http://schemas.openxmlformats.org/drawingml/2006/main" xmlns:r="http://schemas.openxmlformats.org/officeDocument/2006/relationships" xmlns:p="http://schemas.openxmlformats.org/presentationml/2006/main">
+  <p:cSld>
+    <p:spTree>
+      <p:nvGrpSpPr>
+        <p:cNvPr id="1" name=""/>
+        <p:cNvGrpSpPr/>
+        <p:nvPr/>
+      </p:nvGrpSpPr>
+      <p:grpSpPr>
+        <a:xfrm>
+          <a:off x="0" y="0"/>
+          <a:ext cx="0" cy="0"/>
+          <a:chOff x="0" y="0"/>
+          <a:chExt cx="0" cy="0"/>
+        </a:xfrm>
+      </p:grpSpPr>
+      <p:sp>
+        <p:nvSpPr>
+          <p:cNvPr id="2" name="Title 1"/>
+          <p:cNvSpPr txBox="1">
+            <a:spLocks/>
+          </p:cNvSpPr>
+          <p:nvPr/>
+        </p:nvSpPr>
+        <p:spPr>
+          <a:xfrm>
+            <a:off x="641350" y="830263"/>
+            <a:ext cx="13360400" cy="1747837"/>
+          </a:xfrm>
+          <a:prstGeom prst="rect">
+            <a:avLst/>
+          </a:prstGeom>
+        </p:spPr>
+        <p:txBody>
+          <a:bodyPr/>
+          <a:lstStyle>
+            <a:lvl1pPr algn="ctr" rtl="0" eaLnBrk="0" fontAlgn="base" hangingPunct="0">
+              <a:spcBef>
+                <a:spcPct val="0"/>
+              </a:spcBef>
+              <a:spcAft>
+                <a:spcPct val="0"/>
+              </a:spcAft>
+              <a:defRPr sz="4400" kern="1200">
+                <a:solidFill>
+                  <a:schemeClr val="tx1"/>
+                </a:solidFill>
+                <a:latin typeface="+mj-lt"/>
+                <a:ea typeface="+mj-ea"/>
+                <a:cs typeface="+mj-cs"/>
+              </a:defRPr>
+            </a:lvl1pPr>
+            <a:lvl2pPr algn="ctr" rtl="0" eaLnBrk="0" fontAlgn="base" hangingPunct="0">
+              <a:spcBef>
+                <a:spcPct val="0"/>
+              </a:spcBef>
+              <a:spcAft>
+                <a:spcPct val="0"/>
+              </a:spcAft>
+              <a:defRPr sz="4400">
+                <a:solidFill>
+                  <a:schemeClr val="tx1"/>
+                </a:solidFill>
+                <a:latin typeface="Calibri" pitchFamily="34" charset="0"/>
+              </a:defRPr>
+            </a:lvl2pPr>
+            <a:lvl3pPr algn="ctr" rtl="0" eaLnBrk="0" fontAlgn="base" hangingPunct="0">
+              <a:spcBef>
+                <a:spcPct val="0"/>
+              </a:spcBef>
+              <a:spcAft>
+                <a:spcPct val="0"/>
+              </a:spcAft>
+              <a:defRPr sz="4400">
+                <a:solidFill>
+                  <a:schemeClr val="tx1"/>
+                </a:solidFill>
+                <a:latin typeface="Calibri" pitchFamily="34" charset="0"/>
+              </a:defRPr>
+            </a:lvl3pPr>
+            <a:lvl4pPr algn="ctr" rtl="0" eaLnBrk="0" fontAlgn="base" hangingPunct="0">
+              <a:spcBef>
+                <a:spcPct val="0"/>
+              </a:spcBef>
+              <a:spcAft>
+                <a:spcPct val="0"/>
+              </a:spcAft>
+              <a:defRPr sz="4400">
+                <a:solidFill>
+                  <a:schemeClr val="tx1"/>
+                </a:solidFill>
+                <a:latin typeface="Calibri" pitchFamily="34" charset="0"/>
+              </a:defRPr>
+            </a:lvl4pPr>
+            <a:lvl5pPr algn="ctr" rtl="0" eaLnBrk="0" fontAlgn="base" hangingPunct="0">
+              <a:spcBef>
+                <a:spcPct val="0"/>
+              </a:spcBef>
+              <a:spcAft>
+                <a:spcPct val="0"/>
+              </a:spcAft>
+              <a:defRPr sz="4400">
+                <a:solidFill>
+                  <a:schemeClr val="tx1"/>
+                </a:solidFill>
+                <a:latin typeface="Calibri" pitchFamily="34" charset="0"/>
+              </a:defRPr>
+            </a:lvl5pPr>
+            <a:lvl6pPr marL="457200" algn="ctr" rtl="0" fontAlgn="base">
+              <a:spcBef>
+                <a:spcPct val="0"/>
+              </a:spcBef>
+              <a:spcAft>
+                <a:spcPct val="0"/>
+              </a:spcAft>
+              <a:defRPr sz="4400">
+                <a:solidFill>
+                  <a:schemeClr val="tx1"/>
+                </a:solidFill>
+                <a:latin typeface="Calibri" pitchFamily="34" charset="0"/>
+              </a:defRPr>
+            </a:lvl6pPr>
+            <a:lvl7pPr marL="914400" algn="ctr" rtl="0" fontAlgn="base">
+              <a:spcBef>
+                <a:spcPct val="0"/>
+              </a:spcBef>
+              <a:spcAft>
+                <a:spcPct val="0"/>
+              </a:spcAft>
+              <a:defRPr sz="4400">
+                <a:solidFill>
+                  <a:schemeClr val="tx1"/>
+                </a:solidFill>
+                <a:latin typeface="Calibri" pitchFamily="34" charset="0"/>
+              </a:defRPr>
+            </a:lvl7pPr>
+            <a:lvl8pPr marL="1371600" algn="ctr" rtl="0" fontAlgn="base">
+              <a:spcBef>
+                <a:spcPct val="0"/>
+              </a:spcBef>
+              <a:spcAft>
+                <a:spcPct val="0"/>
+              </a:spcAft>
+              <a:defRPr sz="4400">
+                <a:solidFill>
+                  <a:schemeClr val="tx1"/>
+                </a:solidFill>
+                <a:latin typeface="Calibri" pitchFamily="34" charset="0"/>
+              </a:defRPr>
+            </a:lvl8pPr>
+            <a:lvl9pPr marL="1828800" algn="ctr" rtl="0" fontAlgn="base">
+              <a:spcBef>
+                <a:spcPct val="0"/>
+              </a:spcBef>
+              <a:spcAft>
+                <a:spcPct val="0"/>
+              </a:spcAft>
+              <a:defRPr sz="4400">
+                <a:solidFill>
+                  <a:schemeClr val="tx1"/>
+                </a:solidFill>
+                <a:latin typeface="Calibri" pitchFamily="34" charset="0"/>
+              </a:defRPr>
+            </a:lvl9pPr>
+          </a:lstStyle>
+          <a:p>
+            <a:pPr algn="l">
+              <a:defRPr/>
+            </a:pPr>
+            <a:r>
+              <a:rPr lang="en-US" sz="5400" spc="600" dirty="0" smtClean="0">
+                <a:latin typeface="Arial" charset="0"/>
+                <a:cs typeface="Arial" charset="0"/>
+              </a:rPr>
+              <a:t>Subjective Measures</a:t>
+            </a:r>
+            <a:endParaRPr lang="vi-VN" sz="5400" spc="600" dirty="0" smtClean="0">
+              <a:latin typeface="Arial" charset="0"/>
+              <a:cs typeface="Arial" charset="0"/>
+            </a:endParaRPr>
+          </a:p>
+        </p:txBody>
+      </p:sp>
+      <p:pic>
+        <p:nvPicPr>
+          <p:cNvPr id="16387" name="Picture 4"/>
+          <p:cNvPicPr>
+            <a:picLocks noChangeAspect="1"/>
+          </p:cNvPicPr>
+          <p:nvPr/>
+        </p:nvPicPr>
+        <p:blipFill>
+          <a:blip r:embed="rId3">
+            <a:extLst>
+              <a:ext uri="{28A0092B-C50C-407E-A947-70E740481C1C}">
+                <a14:useLocalDpi xmlns:a14="http://schemas.microsoft.com/office/drawing/2010/main" val="0"/>
+              </a:ext>
+            </a:extLst>
+          </a:blip>
+          <a:srcRect/>
+          <a:stretch>
+            <a:fillRect/>
+          </a:stretch>
+        </p:blipFill>
+        <p:spPr bwMode="auto">
+          <a:xfrm>
+            <a:off x="520700" y="1843088"/>
+            <a:ext cx="12846050" cy="441325"/>
+          </a:xfrm>
+          <a:prstGeom prst="rect">
+            <a:avLst/>
+          </a:prstGeom>
+          <a:noFill/>
+          <a:ln>
+            <a:noFill/>
+          </a:ln>
+          <a:extLst>
+            <a:ext uri="{909E8E84-426E-40DD-AFC4-6F175D3DCCD1}">
+              <a14:hiddenFill xmlns:a14="http://schemas.microsoft.com/office/drawing/2010/main">
+                <a:solidFill>
+                  <a:srgbClr val="FFFFFF"/>
+                </a:solidFill>
+              </a14:hiddenFill>
+            </a:ext>
+            <a:ext uri="{91240B29-F687-4F45-9708-019B960494DF}">
+              <a14:hiddenLine xmlns:a14="http://schemas.microsoft.com/office/drawing/2010/main" w="9525">
+                <a:solidFill>
+                  <a:srgbClr val="000000"/>
+                </a:solidFill>
+                <a:miter lim="800000"/>
+                <a:headEnd/>
+                <a:tailEnd/>
+              </a14:hiddenLine>
+            </a:ext>
+          </a:extLst>
+        </p:spPr>
+      </p:pic>
+      <p:sp>
+        <p:nvSpPr>
+          <p:cNvPr id="5" name="Rectangle 4"/>
+          <p:cNvSpPr/>
+          <p:nvPr/>
+        </p:nvSpPr>
+        <p:spPr>
+          <a:xfrm>
+            <a:off x="641350" y="2449513"/>
+            <a:ext cx="13868400" cy="5373687"/>
+          </a:xfrm>
+          <a:prstGeom prst="rect">
+            <a:avLst/>
+          </a:prstGeom>
+        </p:spPr>
+        <p:txBody>
+          <a:bodyPr>
+            <a:spAutoFit/>
+          </a:bodyPr>
+          <a:lstStyle/>
+          <a:p>
+            <a:pPr>
+              <a:lnSpc>
+                <a:spcPct val="150000"/>
+              </a:lnSpc>
+              <a:spcBef>
+                <a:spcPct val="30000"/>
+              </a:spcBef>
+              <a:defRPr/>
+            </a:pPr>
+            <a:r>
+              <a:rPr lang="en-US" sz="4400" dirty="0">
+                <a:cs typeface="Arial" charset="0"/>
+              </a:rPr>
+              <a:t>Definition: an opinion quantified by using a rating scale</a:t>
+            </a:r>
+          </a:p>
+          <a:p>
+            <a:pPr marL="571500" indent="-571500" eaLnBrk="1" hangingPunct="1">
+              <a:lnSpc>
+                <a:spcPct val="150000"/>
+              </a:lnSpc>
+              <a:buFont typeface="Arial" pitchFamily="34" charset="0"/>
+              <a:buChar char="•"/>
+              <a:defRPr/>
+            </a:pPr>
+            <a:r>
+              <a:rPr lang="en-US" sz="4400" dirty="0">
+                <a:cs typeface="Arial" charset="0"/>
+              </a:rPr>
+              <a:t>Customer Satisfaction</a:t>
+            </a:r>
+          </a:p>
+          <a:p>
+            <a:pPr marL="571500" indent="-571500" eaLnBrk="1" hangingPunct="1">
+              <a:lnSpc>
+                <a:spcPct val="150000"/>
+              </a:lnSpc>
+              <a:buFont typeface="Arial" pitchFamily="34" charset="0"/>
+              <a:buChar char="•"/>
+              <a:defRPr/>
+            </a:pPr>
+            <a:r>
+              <a:rPr lang="en-US" sz="4400" dirty="0">
+                <a:cs typeface="Arial" charset="0"/>
+              </a:rPr>
+              <a:t>User Opinion</a:t>
+            </a:r>
+          </a:p>
+          <a:p>
+            <a:pPr>
+              <a:lnSpc>
+                <a:spcPct val="150000"/>
+              </a:lnSpc>
+              <a:spcBef>
+                <a:spcPct val="30000"/>
+              </a:spcBef>
+              <a:defRPr/>
+            </a:pPr>
+            <a:r>
+              <a:rPr lang="en-US" sz="4400" dirty="0" smtClean="0">
+                <a:cs typeface="Arial" charset="0"/>
+                <a:sym typeface="Wingdings" panose="05000000000000000000" pitchFamily="2" charset="2"/>
+              </a:rPr>
+              <a:t></a:t>
+            </a:r>
+            <a:r>
+              <a:rPr lang="en-US" sz="4400" dirty="0" smtClean="0">
+                <a:cs typeface="Arial" charset="0"/>
+              </a:rPr>
+              <a:t> </a:t>
+            </a:r>
+            <a:r>
+              <a:rPr lang="en-US" sz="4400" dirty="0">
+                <a:cs typeface="Arial" charset="0"/>
+              </a:rPr>
+              <a:t>Measure customer satisfaction or user opinion at </a:t>
+            </a:r>
+            <a:r>
+              <a:rPr lang="en-US" sz="4400" b="1" dirty="0">
+                <a:cs typeface="Arial" charset="0"/>
+              </a:rPr>
+              <a:t>key point </a:t>
+            </a:r>
+            <a:r>
+              <a:rPr lang="en-US" sz="4400" dirty="0">
+                <a:cs typeface="Arial" charset="0"/>
+              </a:rPr>
+              <a:t>during the project, not just at the end!</a:t>
+            </a:r>
+          </a:p>
+        </p:txBody>
+      </p:sp>
+    </p:spTree>
+  </p:cSld>
+  <p:clrMapOvr>
+    <a:masterClrMapping/>
+  </p:clrMapOvr>
+  <p:transition spd="slow"/>
+  <p:timing>
+    <p:tnLst>
+      <p:par>
+        <p:cTn id="1" dur="indefinite" restart="never" nodeType="tmRoot">
+          <p:childTnLst>
+            <p:seq concurrent="1" nextAc="seek">
+              <p:cTn id="2" dur="indefinite" nodeType="mainSeq">
+                <p:childTnLst>
+                  <p:par>
+                    <p:cTn id="3" fill="hold">
+                      <p:stCondLst>
+                        <p:cond delay="indefinite"/>
+                        <p:cond evt="onBegin" delay="0">
+                          <p:tn val="2"/>
+                        </p:cond>
+                      </p:stCondLst>
+                      <p:childTnLst>
+                        <p:par>
+                          <p:cTn id="4" fill="hold">
+                            <p:stCondLst>
+                              <p:cond delay="0"/>
+                            </p:stCondLst>
+                            <p:childTnLst>
+                              <p:par>
+                                <p:cTn id="5" presetID="42" presetClass="entr" presetSubtype="0" fill="hold" nodeType="withEffect">
+                                  <p:stCondLst>
+                                    <p:cond delay="500"/>
+                                  </p:stCondLst>
+                                  <p:childTnLst>
+                                    <p:set>
+                                      <p:cBhvr>
+                                        <p:cTn id="6" dur="1" fill="hold">
+                                          <p:stCondLst>
+                                            <p:cond delay="0"/>
+                                          </p:stCondLst>
+                                        </p:cTn>
+                                        <p:tgtEl>
+                                          <p:spTgt spid="5">
+                                            <p:txEl>
+                                              <p:pRg st="3" end="3"/>
+                                            </p:txEl>
+                                          </p:spTgt>
+                                        </p:tgtEl>
+                                        <p:attrNameLst>
+                                          <p:attrName>style.visibility</p:attrName>
+                                        </p:attrNameLst>
+                                      </p:cBhvr>
+                                      <p:to>
+                                        <p:strVal val="visible"/>
+                                      </p:to>
+                                    </p:set>
+                                    <p:animEffect transition="in" filter="fade">
+                                      <p:cBhvr>
+                                        <p:cTn id="7" dur="1000"/>
+                                        <p:tgtEl>
+                                          <p:spTgt spid="5">
+                                            <p:txEl>
+                                              <p:pRg st="3" end="3"/>
+                                            </p:txEl>
+                                          </p:spTgt>
+                                        </p:tgtEl>
+                                      </p:cBhvr>
+                                    </p:animEffect>
+                                    <p:anim calcmode="lin" valueType="num">
+                                      <p:cBhvr>
+                                        <p:cTn id="8" dur="1000" fill="hold"/>
+                                        <p:tgtEl>
+                                          <p:spTgt spid="5">
+                                            <p:txEl>
+                                              <p:pRg st="3" end="3"/>
+                                            </p:txEl>
+                                          </p:spTgt>
+                                        </p:tgtEl>
+                                        <p:attrNameLst>
+                                          <p:attrName>ppt_x</p:attrName>
+                                        </p:attrNameLst>
+                                      </p:cBhvr>
+                                      <p:tavLst>
+                                        <p:tav tm="0">
+                                          <p:val>
+                                            <p:strVal val="#ppt_x"/>
+                                          </p:val>
+                                        </p:tav>
+                                        <p:tav tm="100000">
+                                          <p:val>
+                                            <p:strVal val="#ppt_x"/>
+                                          </p:val>
+                                        </p:tav>
+                                      </p:tavLst>
+                                    </p:anim>
+                                    <p:anim calcmode="lin" valueType="num">
+                                      <p:cBhvr>
+                                        <p:cTn id="9" dur="1000" fill="hold"/>
+                                        <p:tgtEl>
+                                          <p:spTgt spid="5">
+                                            <p:txEl>
+                                              <p:pRg st="3" end="3"/>
+                                            </p:txEl>
+                                          </p:spTgt>
+                                        </p:tgtEl>
+                                        <p:attrNameLst>
+                                          <p:attrName>ppt_y</p:attrName>
+                                        </p:attrNameLst>
+                                      </p:cBhvr>
+                                      <p:tavLst>
+                                        <p:tav tm="0">
+                                          <p:val>
+                                            <p:strVal val="#ppt_y+.1"/>
+                                          </p:val>
+                                        </p:tav>
+                                        <p:tav tm="100000">
+                                          <p:val>
+                                            <p:strVal val="#ppt_y"/>
+                                          </p:val>
+                                        </p:tav>
+                                      </p:tavLst>
+                                    </p:anim>
+                                  </p:childTnLst>
+                                </p:cTn>
+                              </p:par>
+                            </p:childTnLst>
+                          </p:cTn>
+                        </p:par>
+                      </p:childTnLst>
+                    </p:cTn>
+                  </p:par>
+                </p:childTnLst>
+              </p:cTn>
+              <p:prevCondLst>
+                <p:cond evt="onPrev" delay="0">
+                  <p:tgtEl>
+                    <p:sldTgt/>
+                  </p:tgtEl>
+                </p:cond>
+              </p:prevCondLst>
+              <p:nextCondLst>
+                <p:cond evt="onNext" delay="0">
+                  <p:tgtEl>
+                    <p:sldTgt/>
+                  </p:tgtEl>
+                </p:cond>
+              </p:nextCondLst>
+            </p:seq>
+          </p:childTnLst>
+        </p:cTn>
+      </p:par>
+    </p:tnLst>
+  </p:timing>
+</p:sld>
+</file>
+
+<file path=ppt/slides/slide11.xml><?xml version="1.0" encoding="utf-8"?>
 <p:sld xmlns:a="http://schemas.openxmlformats.org/drawingml/2006/main" xmlns:r="http://schemas.openxmlformats.org/officeDocument/2006/relationships" xmlns:p="http://schemas.openxmlformats.org/presentationml/2006/main">
   <p:cSld>
     <p:spTree>
@@ -7324,7 +8538,7 @@
 </p:sld>
 </file>
 
-<file path=ppt/slides/slide11.xml><?xml version="1.0" encoding="utf-8"?>
+<file path=ppt/slides/slide12.xml><?xml version="1.0" encoding="utf-8"?>
 <p:sld xmlns:a="http://schemas.openxmlformats.org/drawingml/2006/main" xmlns:r="http://schemas.openxmlformats.org/officeDocument/2006/relationships" xmlns:p="http://schemas.openxmlformats.org/presentationml/2006/main">
   <p:cSld>
     <p:spTree>
@@ -8712,7 +9926,7 @@
 </p:sld>
 </file>
 
-<file path=ppt/slides/slide12.xml><?xml version="1.0" encoding="utf-8"?>
+<file path=ppt/slides/slide13.xml><?xml version="1.0" encoding="utf-8"?>
 <p:sld xmlns:a="http://schemas.openxmlformats.org/drawingml/2006/main" xmlns:r="http://schemas.openxmlformats.org/officeDocument/2006/relationships" xmlns:p="http://schemas.openxmlformats.org/presentationml/2006/main">
   <p:cSld>
     <p:spTree>
@@ -8783,8 +9997,67 @@
                   </a:outerShdw>
                 </a:effectLst>
               </a:rPr>
-              <a:t>Thanks for your attention</a:t>
+              <a:t>Thanks for your </a:t>
             </a:r>
+            <a:r>
+              <a:rPr lang="en-US" sz="9600" b="1" dirty="0" smtClean="0">
+                <a:ln w="12700">
+                  <a:solidFill>
+                    <a:schemeClr val="tx2">
+                      <a:lumMod val="75000"/>
+                    </a:schemeClr>
+                  </a:solidFill>
+                  <a:prstDash val="solid"/>
+                </a:ln>
+                <a:pattFill prst="dkUpDiag">
+                  <a:fgClr>
+                    <a:schemeClr val="tx2"/>
+                  </a:fgClr>
+                  <a:bgClr>
+                    <a:schemeClr val="tx2">
+                      <a:lumMod val="20000"/>
+                      <a:lumOff val="80000"/>
+                    </a:schemeClr>
+                  </a:bgClr>
+                </a:pattFill>
+                <a:effectLst>
+                  <a:outerShdw dist="38100" dir="2640000" algn="bl" rotWithShape="0">
+                    <a:schemeClr val="tx2">
+                      <a:lumMod val="75000"/>
+                    </a:schemeClr>
+                  </a:outerShdw>
+                </a:effectLst>
+              </a:rPr>
+              <a:t>attention!</a:t>
+            </a:r>
+            <a:endParaRPr lang="en-US" sz="9600" b="1" dirty="0">
+              <a:ln w="12700">
+                <a:solidFill>
+                  <a:schemeClr val="tx2">
+                    <a:lumMod val="75000"/>
+                  </a:schemeClr>
+                </a:solidFill>
+                <a:prstDash val="solid"/>
+              </a:ln>
+              <a:pattFill prst="dkUpDiag">
+                <a:fgClr>
+                  <a:schemeClr val="tx2"/>
+                </a:fgClr>
+                <a:bgClr>
+                  <a:schemeClr val="tx2">
+                    <a:lumMod val="20000"/>
+                    <a:lumOff val="80000"/>
+                  </a:schemeClr>
+                </a:bgClr>
+              </a:pattFill>
+              <a:effectLst>
+                <a:outerShdw dist="38100" dir="2640000" algn="bl" rotWithShape="0">
+                  <a:schemeClr val="tx2">
+                    <a:lumMod val="75000"/>
+                  </a:schemeClr>
+                </a:outerShdw>
+              </a:effectLst>
+            </a:endParaRPr>
           </a:p>
         </p:txBody>
       </p:sp>
@@ -8797,7 +10070,7 @@
           <p:nvPr/>
         </p:nvPicPr>
         <p:blipFill>
-          <a:blip r:embed="rId2" cstate="print">
+          <a:blip r:embed="rId3" cstate="print">
             <a:extLst>
               <a:ext uri="{28A0092B-C50C-407E-A947-70E740481C1C}">
                 <a14:useLocalDpi xmlns:a14="http://schemas.microsoft.com/office/drawing/2010/main" val="0"/>
@@ -8826,7 +10099,142 @@
   <p:timing>
     <p:tnLst>
       <p:par>
-        <p:cTn id="1" dur="indefinite" restart="never" nodeType="tmRoot"/>
+        <p:cTn id="1" dur="indefinite" restart="never" nodeType="tmRoot">
+          <p:childTnLst>
+            <p:seq concurrent="1" nextAc="seek">
+              <p:cTn id="2" dur="indefinite" nodeType="mainSeq">
+                <p:childTnLst>
+                  <p:par>
+                    <p:cTn id="3" fill="hold">
+                      <p:stCondLst>
+                        <p:cond delay="indefinite"/>
+                        <p:cond evt="onBegin" delay="0">
+                          <p:tn val="2"/>
+                        </p:cond>
+                      </p:stCondLst>
+                      <p:childTnLst>
+                        <p:par>
+                          <p:cTn id="4" fill="hold">
+                            <p:stCondLst>
+                              <p:cond delay="0"/>
+                            </p:stCondLst>
+                            <p:childTnLst>
+                              <p:par>
+                                <p:cTn id="5" presetID="32" presetClass="emph" presetSubtype="0" repeatCount="indefinite" fill="hold" nodeType="withEffect">
+                                  <p:stCondLst>
+                                    <p:cond delay="0"/>
+                                  </p:stCondLst>
+                                  <p:endCondLst>
+                                    <p:cond evt="onNext" delay="0">
+                                      <p:tgtEl>
+                                        <p:sldTgt/>
+                                      </p:tgtEl>
+                                    </p:cond>
+                                  </p:endCondLst>
+                                  <p:childTnLst>
+                                    <p:animRot by="120000">
+                                      <p:cBhvr>
+                                        <p:cTn id="6" dur="100" fill="hold">
+                                          <p:stCondLst>
+                                            <p:cond delay="0"/>
+                                          </p:stCondLst>
+                                        </p:cTn>
+                                        <p:tgtEl>
+                                          <p:spTgt spid="6"/>
+                                        </p:tgtEl>
+                                        <p:attrNameLst>
+                                          <p:attrName>r</p:attrName>
+                                        </p:attrNameLst>
+                                      </p:cBhvr>
+                                    </p:animRot>
+                                    <p:animRot by="-240000">
+                                      <p:cBhvr>
+                                        <p:cTn id="7" dur="200" fill="hold">
+                                          <p:stCondLst>
+                                            <p:cond delay="200"/>
+                                          </p:stCondLst>
+                                        </p:cTn>
+                                        <p:tgtEl>
+                                          <p:spTgt spid="6"/>
+                                        </p:tgtEl>
+                                        <p:attrNameLst>
+                                          <p:attrName>r</p:attrName>
+                                        </p:attrNameLst>
+                                      </p:cBhvr>
+                                    </p:animRot>
+                                    <p:animRot by="240000">
+                                      <p:cBhvr>
+                                        <p:cTn id="8" dur="200" fill="hold">
+                                          <p:stCondLst>
+                                            <p:cond delay="400"/>
+                                          </p:stCondLst>
+                                        </p:cTn>
+                                        <p:tgtEl>
+                                          <p:spTgt spid="6"/>
+                                        </p:tgtEl>
+                                        <p:attrNameLst>
+                                          <p:attrName>r</p:attrName>
+                                        </p:attrNameLst>
+                                      </p:cBhvr>
+                                    </p:animRot>
+                                    <p:animRot by="-240000">
+                                      <p:cBhvr>
+                                        <p:cTn id="9" dur="200" fill="hold">
+                                          <p:stCondLst>
+                                            <p:cond delay="600"/>
+                                          </p:stCondLst>
+                                        </p:cTn>
+                                        <p:tgtEl>
+                                          <p:spTgt spid="6"/>
+                                        </p:tgtEl>
+                                        <p:attrNameLst>
+                                          <p:attrName>r</p:attrName>
+                                        </p:attrNameLst>
+                                      </p:cBhvr>
+                                    </p:animRot>
+                                    <p:animRot by="120000">
+                                      <p:cBhvr>
+                                        <p:cTn id="10" dur="200" fill="hold">
+                                          <p:stCondLst>
+                                            <p:cond delay="800"/>
+                                          </p:stCondLst>
+                                        </p:cTn>
+                                        <p:tgtEl>
+                                          <p:spTgt spid="6"/>
+                                        </p:tgtEl>
+                                        <p:attrNameLst>
+                                          <p:attrName>r</p:attrName>
+                                        </p:attrNameLst>
+                                      </p:cBhvr>
+                                    </p:animRot>
+                                  </p:childTnLst>
+                                </p:cTn>
+                              </p:par>
+                            </p:childTnLst>
+                          </p:cTn>
+                        </p:par>
+                      </p:childTnLst>
+                    </p:cTn>
+                  </p:par>
+                </p:childTnLst>
+              </p:cTn>
+              <p:prevCondLst>
+                <p:cond evt="onPrev" delay="0">
+                  <p:tgtEl>
+                    <p:sldTgt/>
+                  </p:tgtEl>
+                </p:cond>
+              </p:prevCondLst>
+              <p:nextCondLst>
+                <p:cond evt="onNext" delay="0">
+                  <p:tgtEl>
+                    <p:sldTgt/>
+                  </p:tgtEl>
+                </p:cond>
+              </p:nextCondLst>
+            </p:seq>
+          </p:childTnLst>
+        </p:cTn>
       </p:par>
     </p:tnLst>
   </p:timing>
@@ -8834,6 +10242,1035 @@
 </file>
 
 <file path=ppt/slides/slide2.xml><?xml version="1.0" encoding="utf-8"?>
+<p:sld xmlns:a="http://schemas.openxmlformats.org/drawingml/2006/main" xmlns:r="http://schemas.openxmlformats.org/officeDocument/2006/relationships" xmlns:p="http://schemas.openxmlformats.org/presentationml/2006/main">
+  <p:cSld>
+    <p:spTree>
+      <p:nvGrpSpPr>
+        <p:cNvPr id="1" name=""/>
+        <p:cNvGrpSpPr/>
+        <p:nvPr/>
+      </p:nvGrpSpPr>
+      <p:grpSpPr>
+        <a:xfrm>
+          <a:off x="0" y="0"/>
+          <a:ext cx="0" cy="0"/>
+          <a:chOff x="0" y="0"/>
+          <a:chExt cx="0" cy="0"/>
+        </a:xfrm>
+      </p:grpSpPr>
+      <p:pic>
+        <p:nvPicPr>
+          <p:cNvPr id="26" name="Picture 25"/>
+          <p:cNvPicPr>
+            <a:picLocks noChangeAspect="1"/>
+          </p:cNvPicPr>
+          <p:nvPr/>
+        </p:nvPicPr>
+        <p:blipFill>
+          <a:blip r:embed="rId2">
+            <a:extLst>
+              <a:ext uri="{28A0092B-C50C-407E-A947-70E740481C1C}">
+                <a14:useLocalDpi xmlns:a14="http://schemas.microsoft.com/office/drawing/2010/main" val="0"/>
+              </a:ext>
+            </a:extLst>
+          </a:blip>
+          <a:stretch>
+            <a:fillRect/>
+          </a:stretch>
+        </p:blipFill>
+        <p:spPr>
+          <a:xfrm>
+            <a:off x="10283611" y="6510551"/>
+            <a:ext cx="2318919" cy="2399023"/>
+          </a:xfrm>
+          <a:prstGeom prst="rect">
+            <a:avLst/>
+          </a:prstGeom>
+        </p:spPr>
+      </p:pic>
+      <p:pic>
+        <p:nvPicPr>
+          <p:cNvPr id="25" name="Picture 24"/>
+          <p:cNvPicPr>
+            <a:picLocks noChangeAspect="1"/>
+          </p:cNvPicPr>
+          <p:nvPr/>
+        </p:nvPicPr>
+        <p:blipFill>
+          <a:blip r:embed="rId3">
+            <a:extLst>
+              <a:ext uri="{28A0092B-C50C-407E-A947-70E740481C1C}">
+                <a14:useLocalDpi xmlns:a14="http://schemas.microsoft.com/office/drawing/2010/main" val="0"/>
+              </a:ext>
+            </a:extLst>
+          </a:blip>
+          <a:stretch>
+            <a:fillRect/>
+          </a:stretch>
+        </p:blipFill>
+        <p:spPr>
+          <a:xfrm>
+            <a:off x="7716462" y="6510551"/>
+            <a:ext cx="2449888" cy="2468349"/>
+          </a:xfrm>
+          <a:prstGeom prst="rect">
+            <a:avLst/>
+          </a:prstGeom>
+        </p:spPr>
+      </p:pic>
+      <p:pic>
+        <p:nvPicPr>
+          <p:cNvPr id="32" name="Picture 31"/>
+          <p:cNvPicPr>
+            <a:picLocks noChangeAspect="1"/>
+          </p:cNvPicPr>
+          <p:nvPr/>
+        </p:nvPicPr>
+        <p:blipFill>
+          <a:blip r:embed="rId4">
+            <a:extLst>
+              <a:ext uri="{28A0092B-C50C-407E-A947-70E740481C1C}">
+                <a14:useLocalDpi xmlns:a14="http://schemas.microsoft.com/office/drawing/2010/main" val="0"/>
+              </a:ext>
+            </a:extLst>
+          </a:blip>
+          <a:stretch>
+            <a:fillRect/>
+          </a:stretch>
+        </p:blipFill>
+        <p:spPr>
+          <a:xfrm>
+            <a:off x="5176452" y="6510551"/>
+            <a:ext cx="2422749" cy="2468349"/>
+          </a:xfrm>
+          <a:prstGeom prst="rect">
+            <a:avLst/>
+          </a:prstGeom>
+        </p:spPr>
+      </p:pic>
+      <p:pic>
+        <p:nvPicPr>
+          <p:cNvPr id="27" name="Picture 26"/>
+          <p:cNvPicPr>
+            <a:picLocks noChangeAspect="1"/>
+          </p:cNvPicPr>
+          <p:nvPr/>
+        </p:nvPicPr>
+        <p:blipFill>
+          <a:blip r:embed="rId5">
+            <a:extLst>
+              <a:ext uri="{28A0092B-C50C-407E-A947-70E740481C1C}">
+                <a14:useLocalDpi xmlns:a14="http://schemas.microsoft.com/office/drawing/2010/main" val="0"/>
+              </a:ext>
+            </a:extLst>
+          </a:blip>
+          <a:stretch>
+            <a:fillRect/>
+          </a:stretch>
+        </p:blipFill>
+        <p:spPr>
+          <a:xfrm>
+            <a:off x="2623362" y="6510551"/>
+            <a:ext cx="2403808" cy="2399023"/>
+          </a:xfrm>
+          <a:prstGeom prst="rect">
+            <a:avLst/>
+          </a:prstGeom>
+        </p:spPr>
+      </p:pic>
+      <p:pic>
+        <p:nvPicPr>
+          <p:cNvPr id="31" name="Picture 30"/>
+          <p:cNvPicPr>
+            <a:picLocks noChangeAspect="1"/>
+          </p:cNvPicPr>
+          <p:nvPr/>
+        </p:nvPicPr>
+        <p:blipFill>
+          <a:blip r:embed="rId6">
+            <a:extLst>
+              <a:ext uri="{28A0092B-C50C-407E-A947-70E740481C1C}">
+                <a14:useLocalDpi xmlns:a14="http://schemas.microsoft.com/office/drawing/2010/main" val="0"/>
+              </a:ext>
+            </a:extLst>
+          </a:blip>
+          <a:stretch>
+            <a:fillRect/>
+          </a:stretch>
+        </p:blipFill>
+        <p:spPr>
+          <a:xfrm>
+            <a:off x="2637414" y="3908824"/>
+            <a:ext cx="2403803" cy="2436922"/>
+          </a:xfrm>
+          <a:prstGeom prst="rect">
+            <a:avLst/>
+          </a:prstGeom>
+        </p:spPr>
+      </p:pic>
+      <p:sp>
+        <p:nvSpPr>
+          <p:cNvPr id="8" name="Rectangle 7"/>
+          <p:cNvSpPr/>
+          <p:nvPr/>
+        </p:nvSpPr>
+        <p:spPr>
+          <a:xfrm>
+            <a:off x="5176452" y="2882900"/>
+            <a:ext cx="4989898" cy="3462846"/>
+          </a:xfrm>
+          <a:prstGeom prst="rect">
+            <a:avLst/>
+          </a:prstGeom>
+          <a:solidFill>
+            <a:srgbClr val="C00000"/>
+          </a:solidFill>
+          <a:ln>
+            <a:noFill/>
+          </a:ln>
+        </p:spPr>
+        <p:style>
+          <a:lnRef idx="2">
+            <a:schemeClr val="accent1">
+              <a:shade val="50000"/>
+            </a:schemeClr>
+          </a:lnRef>
+          <a:fillRef idx="1001">
+            <a:schemeClr val="dk2"/>
+          </a:fillRef>
+          <a:effectRef idx="0">
+            <a:schemeClr val="accent1"/>
+          </a:effectRef>
+          <a:fontRef idx="minor">
+            <a:schemeClr val="lt1"/>
+          </a:fontRef>
+        </p:style>
+        <p:txBody>
+          <a:bodyPr rtlCol="0" anchor="ctr"/>
+          <a:lstStyle/>
+          <a:p>
+            <a:endParaRPr lang="en-US" sz="3410" dirty="0">
+              <a:solidFill>
+                <a:schemeClr val="bg1"/>
+              </a:solidFill>
+            </a:endParaRPr>
+          </a:p>
+        </p:txBody>
+      </p:sp>
+      <p:sp>
+        <p:nvSpPr>
+          <p:cNvPr id="22" name="Title 1"/>
+          <p:cNvSpPr txBox="1">
+            <a:spLocks/>
+          </p:cNvSpPr>
+          <p:nvPr/>
+        </p:nvSpPr>
+        <p:spPr>
+          <a:xfrm>
+            <a:off x="7951522" y="4707754"/>
+            <a:ext cx="1264520" cy="627434"/>
+          </a:xfrm>
+          <a:prstGeom prst="rect">
+            <a:avLst/>
+          </a:prstGeom>
+        </p:spPr>
+        <p:txBody>
+          <a:bodyPr vert="horz" wrap="square" lIns="0" tIns="0" rIns="0" bIns="0" rtlCol="0" anchor="ctr">
+            <a:noAutofit/>
+          </a:bodyPr>
+          <a:lstStyle>
+            <a:lvl1pPr algn="l" defTabSz="914363" rtl="0" eaLnBrk="1" latinLnBrk="0" hangingPunct="1">
+              <a:lnSpc>
+                <a:spcPct val="90000"/>
+              </a:lnSpc>
+              <a:spcBef>
+                <a:spcPct val="0"/>
+              </a:spcBef>
+              <a:buNone/>
+              <a:defRPr lang="en-US" sz="4000" b="1" kern="1200" cap="none" spc="-100" baseline="0" dirty="0">
+                <a:ln w="3175">
+                  <a:noFill/>
+                </a:ln>
+                <a:solidFill>
+                  <a:schemeClr val="accent1">
+                    <a:alpha val="99000"/>
+                  </a:schemeClr>
+                </a:solidFill>
+                <a:effectLst/>
+                <a:latin typeface="Segoe UI" pitchFamily="34" charset="0"/>
+                <a:ea typeface="Segoe UI" pitchFamily="34" charset="0"/>
+                <a:cs typeface="Segoe UI" pitchFamily="34" charset="0"/>
+              </a:defRPr>
+            </a:lvl1pPr>
+          </a:lstStyle>
+          <a:p>
+            <a:r>
+              <a:rPr lang="en-US" sz="2923" dirty="0">
+                <a:solidFill>
+                  <a:schemeClr val="bg1">
+                    <a:alpha val="99000"/>
+                  </a:schemeClr>
+                </a:solidFill>
+              </a:rPr>
+              <a:t>K16T1</a:t>
+            </a:r>
+            <a:endParaRPr lang="en-US" sz="2923" dirty="0">
+              <a:solidFill>
+                <a:schemeClr val="bg1">
+                  <a:alpha val="99000"/>
+                </a:schemeClr>
+              </a:solidFill>
+            </a:endParaRPr>
+          </a:p>
+        </p:txBody>
+      </p:sp>
+      <p:sp>
+        <p:nvSpPr>
+          <p:cNvPr id="23" name="Title 1"/>
+          <p:cNvSpPr txBox="1">
+            <a:spLocks/>
+          </p:cNvSpPr>
+          <p:nvPr/>
+        </p:nvSpPr>
+        <p:spPr>
+          <a:xfrm>
+            <a:off x="6013779" y="3644900"/>
+            <a:ext cx="3846711" cy="1534136"/>
+          </a:xfrm>
+          <a:prstGeom prst="rect">
+            <a:avLst/>
+          </a:prstGeom>
+        </p:spPr>
+        <p:txBody>
+          <a:bodyPr vert="horz" wrap="square" lIns="0" tIns="0" rIns="0" bIns="0" rtlCol="0" anchor="ctr">
+            <a:noAutofit/>
+          </a:bodyPr>
+          <a:lstStyle>
+            <a:lvl1pPr algn="l" defTabSz="914363" rtl="0" eaLnBrk="1" latinLnBrk="0" hangingPunct="1">
+              <a:lnSpc>
+                <a:spcPct val="90000"/>
+              </a:lnSpc>
+              <a:spcBef>
+                <a:spcPct val="0"/>
+              </a:spcBef>
+              <a:buNone/>
+              <a:defRPr lang="en-US" sz="4000" b="1" kern="1200" cap="none" spc="-100" baseline="0" dirty="0">
+                <a:ln w="3175">
+                  <a:noFill/>
+                </a:ln>
+                <a:solidFill>
+                  <a:schemeClr val="accent1">
+                    <a:alpha val="99000"/>
+                  </a:schemeClr>
+                </a:solidFill>
+                <a:effectLst/>
+                <a:latin typeface="Segoe UI" pitchFamily="34" charset="0"/>
+                <a:ea typeface="Segoe UI" pitchFamily="34" charset="0"/>
+                <a:cs typeface="Segoe UI" pitchFamily="34" charset="0"/>
+              </a:defRPr>
+            </a:lvl1pPr>
+          </a:lstStyle>
+          <a:p>
+            <a:r>
+              <a:rPr lang="vi-VN" sz="7308" dirty="0">
+                <a:solidFill>
+                  <a:schemeClr val="bg1">
+                    <a:alpha val="99000"/>
+                  </a:schemeClr>
+                </a:solidFill>
+              </a:rPr>
+              <a:t>BigFive</a:t>
+            </a:r>
+            <a:endParaRPr lang="vi-VN" sz="7308" dirty="0">
+              <a:solidFill>
+                <a:schemeClr val="bg1">
+                  <a:alpha val="99000"/>
+                </a:schemeClr>
+              </a:solidFill>
+            </a:endParaRPr>
+          </a:p>
+        </p:txBody>
+      </p:sp>
+      <p:sp>
+        <p:nvSpPr>
+          <p:cNvPr id="24" name="Rectangle 23"/>
+          <p:cNvSpPr/>
+          <p:nvPr/>
+        </p:nvSpPr>
+        <p:spPr>
+          <a:xfrm>
+            <a:off x="8760912" y="3792874"/>
+            <a:ext cx="455130" cy="630642"/>
+          </a:xfrm>
+          <a:prstGeom prst="rect">
+            <a:avLst/>
+          </a:prstGeom>
+        </p:spPr>
+        <p:txBody>
+          <a:bodyPr wrap="square">
+            <a:spAutoFit/>
+          </a:bodyPr>
+          <a:lstStyle/>
+          <a:p>
+            <a:r>
+              <a:rPr lang="en-US" sz="3410" dirty="0">
+                <a:solidFill>
+                  <a:schemeClr val="bg1"/>
+                </a:solidFill>
+              </a:rPr>
+              <a:t>®</a:t>
+            </a:r>
+          </a:p>
+        </p:txBody>
+      </p:sp>
+      <p:pic>
+        <p:nvPicPr>
+          <p:cNvPr id="2" name="Picture 1"/>
+          <p:cNvPicPr>
+            <a:picLocks noChangeAspect="1"/>
+          </p:cNvPicPr>
+          <p:nvPr/>
+        </p:nvPicPr>
+        <p:blipFill>
+          <a:blip r:embed="rId7">
+            <a:extLst>
+              <a:ext uri="{28A0092B-C50C-407E-A947-70E740481C1C}">
+                <a14:useLocalDpi xmlns:a14="http://schemas.microsoft.com/office/drawing/2010/main" val="0"/>
+              </a:ext>
+            </a:extLst>
+          </a:blip>
+          <a:stretch>
+            <a:fillRect/>
+          </a:stretch>
+        </p:blipFill>
+        <p:spPr>
+          <a:xfrm>
+            <a:off x="10297663" y="3908824"/>
+            <a:ext cx="2318919" cy="2436922"/>
+          </a:xfrm>
+          <a:prstGeom prst="rect">
+            <a:avLst/>
+          </a:prstGeom>
+        </p:spPr>
+      </p:pic>
+      <p:sp>
+        <p:nvSpPr>
+          <p:cNvPr id="14" name="Title 1"/>
+          <p:cNvSpPr txBox="1">
+            <a:spLocks/>
+          </p:cNvSpPr>
+          <p:nvPr/>
+        </p:nvSpPr>
+        <p:spPr>
+          <a:xfrm>
+            <a:off x="742950" y="792949"/>
+            <a:ext cx="13360400" cy="1747838"/>
+          </a:xfrm>
+          <a:prstGeom prst="rect">
+            <a:avLst/>
+          </a:prstGeom>
+        </p:spPr>
+        <p:txBody>
+          <a:bodyPr/>
+          <a:lstStyle>
+            <a:lvl1pPr algn="ctr" rtl="0" eaLnBrk="0" fontAlgn="base" hangingPunct="0">
+              <a:spcBef>
+                <a:spcPct val="0"/>
+              </a:spcBef>
+              <a:spcAft>
+                <a:spcPct val="0"/>
+              </a:spcAft>
+              <a:defRPr sz="4400" kern="1200">
+                <a:solidFill>
+                  <a:schemeClr val="tx1"/>
+                </a:solidFill>
+                <a:latin typeface="+mj-lt"/>
+                <a:ea typeface="+mj-ea"/>
+                <a:cs typeface="+mj-cs"/>
+              </a:defRPr>
+            </a:lvl1pPr>
+            <a:lvl2pPr algn="ctr" rtl="0" eaLnBrk="0" fontAlgn="base" hangingPunct="0">
+              <a:spcBef>
+                <a:spcPct val="0"/>
+              </a:spcBef>
+              <a:spcAft>
+                <a:spcPct val="0"/>
+              </a:spcAft>
+              <a:defRPr sz="4400">
+                <a:solidFill>
+                  <a:schemeClr val="tx1"/>
+                </a:solidFill>
+                <a:latin typeface="Calibri" pitchFamily="34" charset="0"/>
+              </a:defRPr>
+            </a:lvl2pPr>
+            <a:lvl3pPr algn="ctr" rtl="0" eaLnBrk="0" fontAlgn="base" hangingPunct="0">
+              <a:spcBef>
+                <a:spcPct val="0"/>
+              </a:spcBef>
+              <a:spcAft>
+                <a:spcPct val="0"/>
+              </a:spcAft>
+              <a:defRPr sz="4400">
+                <a:solidFill>
+                  <a:schemeClr val="tx1"/>
+                </a:solidFill>
+                <a:latin typeface="Calibri" pitchFamily="34" charset="0"/>
+              </a:defRPr>
+            </a:lvl3pPr>
+            <a:lvl4pPr algn="ctr" rtl="0" eaLnBrk="0" fontAlgn="base" hangingPunct="0">
+              <a:spcBef>
+                <a:spcPct val="0"/>
+              </a:spcBef>
+              <a:spcAft>
+                <a:spcPct val="0"/>
+              </a:spcAft>
+              <a:defRPr sz="4400">
+                <a:solidFill>
+                  <a:schemeClr val="tx1"/>
+                </a:solidFill>
+                <a:latin typeface="Calibri" pitchFamily="34" charset="0"/>
+              </a:defRPr>
+            </a:lvl4pPr>
+            <a:lvl5pPr algn="ctr" rtl="0" eaLnBrk="0" fontAlgn="base" hangingPunct="0">
+              <a:spcBef>
+                <a:spcPct val="0"/>
+              </a:spcBef>
+              <a:spcAft>
+                <a:spcPct val="0"/>
+              </a:spcAft>
+              <a:defRPr sz="4400">
+                <a:solidFill>
+                  <a:schemeClr val="tx1"/>
+                </a:solidFill>
+                <a:latin typeface="Calibri" pitchFamily="34" charset="0"/>
+              </a:defRPr>
+            </a:lvl5pPr>
+            <a:lvl6pPr marL="457200" algn="ctr" rtl="0" fontAlgn="base">
+              <a:spcBef>
+                <a:spcPct val="0"/>
+              </a:spcBef>
+              <a:spcAft>
+                <a:spcPct val="0"/>
+              </a:spcAft>
+              <a:defRPr sz="4400">
+                <a:solidFill>
+                  <a:schemeClr val="tx1"/>
+                </a:solidFill>
+                <a:latin typeface="Calibri" pitchFamily="34" charset="0"/>
+              </a:defRPr>
+            </a:lvl6pPr>
+            <a:lvl7pPr marL="914400" algn="ctr" rtl="0" fontAlgn="base">
+              <a:spcBef>
+                <a:spcPct val="0"/>
+              </a:spcBef>
+              <a:spcAft>
+                <a:spcPct val="0"/>
+              </a:spcAft>
+              <a:defRPr sz="4400">
+                <a:solidFill>
+                  <a:schemeClr val="tx1"/>
+                </a:solidFill>
+                <a:latin typeface="Calibri" pitchFamily="34" charset="0"/>
+              </a:defRPr>
+            </a:lvl7pPr>
+            <a:lvl8pPr marL="1371600" algn="ctr" rtl="0" fontAlgn="base">
+              <a:spcBef>
+                <a:spcPct val="0"/>
+              </a:spcBef>
+              <a:spcAft>
+                <a:spcPct val="0"/>
+              </a:spcAft>
+              <a:defRPr sz="4400">
+                <a:solidFill>
+                  <a:schemeClr val="tx1"/>
+                </a:solidFill>
+                <a:latin typeface="Calibri" pitchFamily="34" charset="0"/>
+              </a:defRPr>
+            </a:lvl8pPr>
+            <a:lvl9pPr marL="1828800" algn="ctr" rtl="0" fontAlgn="base">
+              <a:spcBef>
+                <a:spcPct val="0"/>
+              </a:spcBef>
+              <a:spcAft>
+                <a:spcPct val="0"/>
+              </a:spcAft>
+              <a:defRPr sz="4400">
+                <a:solidFill>
+                  <a:schemeClr val="tx1"/>
+                </a:solidFill>
+                <a:latin typeface="Calibri" pitchFamily="34" charset="0"/>
+              </a:defRPr>
+            </a:lvl9pPr>
+          </a:lstStyle>
+          <a:p>
+            <a:pPr algn="l"/>
+            <a:r>
+              <a:rPr lang="en-US" sz="6000" dirty="0" smtClean="0">
+                <a:latin typeface="Arial" panose="020B0604020202020204" pitchFamily="34" charset="0"/>
+                <a:cs typeface="Arial" panose="020B0604020202020204" pitchFamily="34" charset="0"/>
+              </a:rPr>
+              <a:t>Meet the team</a:t>
+            </a:r>
+            <a:endParaRPr lang="en-US" sz="6000" dirty="0">
+              <a:latin typeface="Arial" panose="020B0604020202020204" pitchFamily="34" charset="0"/>
+              <a:cs typeface="Arial" panose="020B0604020202020204" pitchFamily="34" charset="0"/>
+            </a:endParaRPr>
+          </a:p>
+        </p:txBody>
+      </p:sp>
+      <p:pic>
+        <p:nvPicPr>
+          <p:cNvPr id="15" name="Picture 4"/>
+          <p:cNvPicPr>
+            <a:picLocks noChangeAspect="1"/>
+          </p:cNvPicPr>
+          <p:nvPr/>
+        </p:nvPicPr>
+        <p:blipFill>
+          <a:blip r:embed="rId8">
+            <a:extLst>
+              <a:ext uri="{28A0092B-C50C-407E-A947-70E740481C1C}">
+                <a14:useLocalDpi xmlns:a14="http://schemas.microsoft.com/office/drawing/2010/main" val="0"/>
+              </a:ext>
+            </a:extLst>
+          </a:blip>
+          <a:srcRect/>
+          <a:stretch>
+            <a:fillRect/>
+          </a:stretch>
+        </p:blipFill>
+        <p:spPr bwMode="auto">
+          <a:xfrm>
+            <a:off x="539750" y="1810599"/>
+            <a:ext cx="13563600" cy="465137"/>
+          </a:xfrm>
+          <a:prstGeom prst="rect">
+            <a:avLst/>
+          </a:prstGeom>
+          <a:noFill/>
+          <a:ln>
+            <a:noFill/>
+          </a:ln>
+          <a:extLst>
+            <a:ext uri="{909E8E84-426E-40DD-AFC4-6F175D3DCCD1}">
+              <a14:hiddenFill xmlns:a14="http://schemas.microsoft.com/office/drawing/2010/main">
+                <a:solidFill>
+                  <a:srgbClr val="FFFFFF"/>
+                </a:solidFill>
+              </a14:hiddenFill>
+            </a:ext>
+            <a:ext uri="{91240B29-F687-4F45-9708-019B960494DF}">
+              <a14:hiddenLine xmlns:a14="http://schemas.microsoft.com/office/drawing/2010/main" w="9525">
+                <a:solidFill>
+                  <a:srgbClr val="000000"/>
+                </a:solidFill>
+                <a:miter lim="800000"/>
+                <a:headEnd/>
+                <a:tailEnd/>
+              </a14:hiddenLine>
+            </a:ext>
+          </a:extLst>
+        </p:spPr>
+      </p:pic>
+    </p:spTree>
+    <p:extLst>
+      <p:ext uri="{BB962C8B-B14F-4D97-AF65-F5344CB8AC3E}">
+        <p14:creationId xmlns:p14="http://schemas.microsoft.com/office/powerpoint/2010/main" val="3724133602"/>
+      </p:ext>
+    </p:extLst>
+  </p:cSld>
+  <p:clrMapOvr>
+    <a:masterClrMapping/>
+  </p:clrMapOvr>
+  <p:transition>
+    <p:fade/>
+  </p:transition>
+  <p:timing>
+    <p:tnLst>
+      <p:par>
+        <p:cTn id="1" dur="indefinite" restart="never" nodeType="tmRoot">
+          <p:childTnLst>
+            <p:seq concurrent="1" nextAc="seek">
+              <p:cTn id="2" dur="indefinite" nodeType="mainSeq">
+                <p:childTnLst>
+                  <p:par>
+                    <p:cTn id="3" fill="hold">
+                      <p:stCondLst>
+                        <p:cond delay="indefinite"/>
+                        <p:cond evt="onBegin" delay="0">
+                          <p:tn val="2"/>
+                        </p:cond>
+                      </p:stCondLst>
+                      <p:childTnLst>
+                        <p:par>
+                          <p:cTn id="4" fill="hold">
+                            <p:stCondLst>
+                              <p:cond delay="0"/>
+                            </p:stCondLst>
+                            <p:childTnLst>
+                              <p:par>
+                                <p:cTn id="5" presetID="10" presetClass="entr" presetSubtype="0" fill="hold" nodeType="withEffect">
+                                  <p:stCondLst>
+                                    <p:cond delay="0"/>
+                                  </p:stCondLst>
+                                  <p:childTnLst>
+                                    <p:set>
+                                      <p:cBhvr>
+                                        <p:cTn id="6" dur="1" fill="hold">
+                                          <p:stCondLst>
+                                            <p:cond delay="0"/>
+                                          </p:stCondLst>
+                                        </p:cTn>
+                                        <p:tgtEl>
+                                          <p:spTgt spid="31"/>
+                                        </p:tgtEl>
+                                        <p:attrNameLst>
+                                          <p:attrName>style.visibility</p:attrName>
+                                        </p:attrNameLst>
+                                      </p:cBhvr>
+                                      <p:to>
+                                        <p:strVal val="visible"/>
+                                      </p:to>
+                                    </p:set>
+                                    <p:animEffect transition="in" filter="fade">
+                                      <p:cBhvr>
+                                        <p:cTn id="7" dur="500"/>
+                                        <p:tgtEl>
+                                          <p:spTgt spid="31"/>
+                                        </p:tgtEl>
+                                      </p:cBhvr>
+                                    </p:animEffect>
+                                  </p:childTnLst>
+                                </p:cTn>
+                              </p:par>
+                            </p:childTnLst>
+                          </p:cTn>
+                        </p:par>
+                        <p:par>
+                          <p:cTn id="8" fill="hold">
+                            <p:stCondLst>
+                              <p:cond delay="500"/>
+                            </p:stCondLst>
+                            <p:childTnLst>
+                              <p:par>
+                                <p:cTn id="9" presetID="10" presetClass="entr" presetSubtype="0" fill="hold" nodeType="afterEffect">
+                                  <p:stCondLst>
+                                    <p:cond delay="0"/>
+                                  </p:stCondLst>
+                                  <p:childTnLst>
+                                    <p:set>
+                                      <p:cBhvr>
+                                        <p:cTn id="10" dur="1" fill="hold">
+                                          <p:stCondLst>
+                                            <p:cond delay="0"/>
+                                          </p:stCondLst>
+                                        </p:cTn>
+                                        <p:tgtEl>
+                                          <p:spTgt spid="27"/>
+                                        </p:tgtEl>
+                                        <p:attrNameLst>
+                                          <p:attrName>style.visibility</p:attrName>
+                                        </p:attrNameLst>
+                                      </p:cBhvr>
+                                      <p:to>
+                                        <p:strVal val="visible"/>
+                                      </p:to>
+                                    </p:set>
+                                    <p:animEffect transition="in" filter="fade">
+                                      <p:cBhvr>
+                                        <p:cTn id="11" dur="500"/>
+                                        <p:tgtEl>
+                                          <p:spTgt spid="27"/>
+                                        </p:tgtEl>
+                                      </p:cBhvr>
+                                    </p:animEffect>
+                                  </p:childTnLst>
+                                </p:cTn>
+                              </p:par>
+                            </p:childTnLst>
+                          </p:cTn>
+                        </p:par>
+                        <p:par>
+                          <p:cTn id="12" fill="hold">
+                            <p:stCondLst>
+                              <p:cond delay="1000"/>
+                            </p:stCondLst>
+                            <p:childTnLst>
+                              <p:par>
+                                <p:cTn id="13" presetID="10" presetClass="entr" presetSubtype="0" fill="hold" nodeType="afterEffect">
+                                  <p:stCondLst>
+                                    <p:cond delay="0"/>
+                                  </p:stCondLst>
+                                  <p:childTnLst>
+                                    <p:set>
+                                      <p:cBhvr>
+                                        <p:cTn id="14" dur="1" fill="hold">
+                                          <p:stCondLst>
+                                            <p:cond delay="0"/>
+                                          </p:stCondLst>
+                                        </p:cTn>
+                                        <p:tgtEl>
+                                          <p:spTgt spid="32"/>
+                                        </p:tgtEl>
+                                        <p:attrNameLst>
+                                          <p:attrName>style.visibility</p:attrName>
+                                        </p:attrNameLst>
+                                      </p:cBhvr>
+                                      <p:to>
+                                        <p:strVal val="visible"/>
+                                      </p:to>
+                                    </p:set>
+                                    <p:animEffect transition="in" filter="fade">
+                                      <p:cBhvr>
+                                        <p:cTn id="15" dur="500"/>
+                                        <p:tgtEl>
+                                          <p:spTgt spid="32"/>
+                                        </p:tgtEl>
+                                      </p:cBhvr>
+                                    </p:animEffect>
+                                  </p:childTnLst>
+                                </p:cTn>
+                              </p:par>
+                            </p:childTnLst>
+                          </p:cTn>
+                        </p:par>
+                        <p:par>
+                          <p:cTn id="16" fill="hold">
+                            <p:stCondLst>
+                              <p:cond delay="1500"/>
+                            </p:stCondLst>
+                            <p:childTnLst>
+                              <p:par>
+                                <p:cTn id="17" presetID="10" presetClass="entr" presetSubtype="0" fill="hold" nodeType="afterEffect">
+                                  <p:stCondLst>
+                                    <p:cond delay="0"/>
+                                  </p:stCondLst>
+                                  <p:childTnLst>
+                                    <p:set>
+                                      <p:cBhvr>
+                                        <p:cTn id="18" dur="1" fill="hold">
+                                          <p:stCondLst>
+                                            <p:cond delay="0"/>
+                                          </p:stCondLst>
+                                        </p:cTn>
+                                        <p:tgtEl>
+                                          <p:spTgt spid="25"/>
+                                        </p:tgtEl>
+                                        <p:attrNameLst>
+                                          <p:attrName>style.visibility</p:attrName>
+                                        </p:attrNameLst>
+                                      </p:cBhvr>
+                                      <p:to>
+                                        <p:strVal val="visible"/>
+                                      </p:to>
+                                    </p:set>
+                                    <p:animEffect transition="in" filter="fade">
+                                      <p:cBhvr>
+                                        <p:cTn id="19" dur="500"/>
+                                        <p:tgtEl>
+                                          <p:spTgt spid="25"/>
+                                        </p:tgtEl>
+                                      </p:cBhvr>
+                                    </p:animEffect>
+                                  </p:childTnLst>
+                                </p:cTn>
+                              </p:par>
+                            </p:childTnLst>
+                          </p:cTn>
+                        </p:par>
+                        <p:par>
+                          <p:cTn id="20" fill="hold">
+                            <p:stCondLst>
+                              <p:cond delay="2000"/>
+                            </p:stCondLst>
+                            <p:childTnLst>
+                              <p:par>
+                                <p:cTn id="21" presetID="10" presetClass="entr" presetSubtype="0" fill="hold" nodeType="afterEffect">
+                                  <p:stCondLst>
+                                    <p:cond delay="0"/>
+                                  </p:stCondLst>
+                                  <p:childTnLst>
+                                    <p:set>
+                                      <p:cBhvr>
+                                        <p:cTn id="22" dur="1" fill="hold">
+                                          <p:stCondLst>
+                                            <p:cond delay="0"/>
+                                          </p:stCondLst>
+                                        </p:cTn>
+                                        <p:tgtEl>
+                                          <p:spTgt spid="26"/>
+                                        </p:tgtEl>
+                                        <p:attrNameLst>
+                                          <p:attrName>style.visibility</p:attrName>
+                                        </p:attrNameLst>
+                                      </p:cBhvr>
+                                      <p:to>
+                                        <p:strVal val="visible"/>
+                                      </p:to>
+                                    </p:set>
+                                    <p:animEffect transition="in" filter="fade">
+                                      <p:cBhvr>
+                                        <p:cTn id="23" dur="500"/>
+                                        <p:tgtEl>
+                                          <p:spTgt spid="26"/>
+                                        </p:tgtEl>
+                                      </p:cBhvr>
+                                    </p:animEffect>
+                                  </p:childTnLst>
+                                </p:cTn>
+                              </p:par>
+                            </p:childTnLst>
+                          </p:cTn>
+                        </p:par>
+                        <p:par>
+                          <p:cTn id="24" fill="hold">
+                            <p:stCondLst>
+                              <p:cond delay="2500"/>
+                            </p:stCondLst>
+                            <p:childTnLst>
+                              <p:par>
+                                <p:cTn id="25" presetID="10" presetClass="entr" presetSubtype="0" fill="hold" nodeType="afterEffect">
+                                  <p:stCondLst>
+                                    <p:cond delay="0"/>
+                                  </p:stCondLst>
+                                  <p:childTnLst>
+                                    <p:set>
+                                      <p:cBhvr>
+                                        <p:cTn id="26" dur="1" fill="hold">
+                                          <p:stCondLst>
+                                            <p:cond delay="0"/>
+                                          </p:stCondLst>
+                                        </p:cTn>
+                                        <p:tgtEl>
+                                          <p:spTgt spid="2"/>
+                                        </p:tgtEl>
+                                        <p:attrNameLst>
+                                          <p:attrName>style.visibility</p:attrName>
+                                        </p:attrNameLst>
+                                      </p:cBhvr>
+                                      <p:to>
+                                        <p:strVal val="visible"/>
+                                      </p:to>
+                                    </p:set>
+                                    <p:animEffect transition="in" filter="fade">
+                                      <p:cBhvr>
+                                        <p:cTn id="27" dur="500"/>
+                                        <p:tgtEl>
+                                          <p:spTgt spid="2"/>
+                                        </p:tgtEl>
+                                      </p:cBhvr>
+                                    </p:animEffect>
+                                  </p:childTnLst>
+                                </p:cTn>
+                              </p:par>
+                              <p:par>
+                                <p:cTn id="28" presetID="2" presetClass="entr" presetSubtype="4" fill="hold" grpId="0" nodeType="withEffect">
+                                  <p:stCondLst>
+                                    <p:cond delay="0"/>
+                                  </p:stCondLst>
+                                  <p:childTnLst>
+                                    <p:set>
+                                      <p:cBhvr>
+                                        <p:cTn id="29" dur="1" fill="hold">
+                                          <p:stCondLst>
+                                            <p:cond delay="0"/>
+                                          </p:stCondLst>
+                                        </p:cTn>
+                                        <p:tgtEl>
+                                          <p:spTgt spid="8"/>
+                                        </p:tgtEl>
+                                        <p:attrNameLst>
+                                          <p:attrName>style.visibility</p:attrName>
+                                        </p:attrNameLst>
+                                      </p:cBhvr>
+                                      <p:to>
+                                        <p:strVal val="visible"/>
+                                      </p:to>
+                                    </p:set>
+                                    <p:anim calcmode="lin" valueType="num">
+                                      <p:cBhvr additive="base">
+                                        <p:cTn id="30" dur="500" fill="hold"/>
+                                        <p:tgtEl>
+                                          <p:spTgt spid="8"/>
+                                        </p:tgtEl>
+                                        <p:attrNameLst>
+                                          <p:attrName>ppt_x</p:attrName>
+                                        </p:attrNameLst>
+                                      </p:cBhvr>
+                                      <p:tavLst>
+                                        <p:tav tm="0">
+                                          <p:val>
+                                            <p:strVal val="#ppt_x"/>
+                                          </p:val>
+                                        </p:tav>
+                                        <p:tav tm="100000">
+                                          <p:val>
+                                            <p:strVal val="#ppt_x"/>
+                                          </p:val>
+                                        </p:tav>
+                                      </p:tavLst>
+                                    </p:anim>
+                                    <p:anim calcmode="lin" valueType="num">
+                                      <p:cBhvr additive="base">
+                                        <p:cTn id="31" dur="500" fill="hold"/>
+                                        <p:tgtEl>
+                                          <p:spTgt spid="8"/>
+                                        </p:tgtEl>
+                                        <p:attrNameLst>
+                                          <p:attrName>ppt_y</p:attrName>
+                                        </p:attrNameLst>
+                                      </p:cBhvr>
+                                      <p:tavLst>
+                                        <p:tav tm="0">
+                                          <p:val>
+                                            <p:strVal val="1+#ppt_h/2"/>
+                                          </p:val>
+                                        </p:tav>
+                                        <p:tav tm="100000">
+                                          <p:val>
+                                            <p:strVal val="#ppt_y"/>
+                                          </p:val>
+                                        </p:tav>
+                                      </p:tavLst>
+                                    </p:anim>
+                                  </p:childTnLst>
+                                </p:cTn>
+                              </p:par>
+                            </p:childTnLst>
+                          </p:cTn>
+                        </p:par>
+                      </p:childTnLst>
+                    </p:cTn>
+                  </p:par>
+                </p:childTnLst>
+              </p:cTn>
+              <p:prevCondLst>
+                <p:cond evt="onPrev" delay="0">
+                  <p:tgtEl>
+                    <p:sldTgt/>
+                  </p:tgtEl>
+                </p:cond>
+              </p:prevCondLst>
+              <p:nextCondLst>
+                <p:cond evt="onNext" delay="0">
+                  <p:tgtEl>
+                    <p:sldTgt/>
+                  </p:tgtEl>
+                </p:cond>
+              </p:nextCondLst>
+            </p:seq>
+          </p:childTnLst>
+        </p:cTn>
+      </p:par>
+    </p:tnLst>
+    <p:bldLst>
+      <p:bldP spid="8" grpId="0" animBg="1"/>
+    </p:bldLst>
+  </p:timing>
+</p:sld>
+</file>
+
+<file path=ppt/slides/slide3.xml><?xml version="1.0" encoding="utf-8"?>
 <p:sld xmlns:a="http://schemas.openxmlformats.org/drawingml/2006/main" xmlns:r="http://schemas.openxmlformats.org/officeDocument/2006/relationships" xmlns:p="http://schemas.openxmlformats.org/presentationml/2006/main">
   <p:cSld>
     <p:spTree>
@@ -8872,13 +11309,13 @@
           <a:p>
             <a:pPr algn="l"/>
             <a:r>
-              <a:rPr lang="en-US" sz="6000" smtClean="0">
+              <a:rPr lang="en-US" sz="6000" dirty="0" smtClean="0">
                 <a:latin typeface="Arial" panose="020B0604020202020204" pitchFamily="34" charset="0"/>
                 <a:cs typeface="Arial" panose="020B0604020202020204" pitchFamily="34" charset="0"/>
               </a:rPr>
               <a:t>Agenda:</a:t>
             </a:r>
-            <a:endParaRPr lang="vi-VN" sz="6000" smtClean="0">
+            <a:endParaRPr lang="vi-VN" sz="6000" dirty="0" smtClean="0">
               <a:latin typeface="Arial" panose="020B0604020202020204" pitchFamily="34" charset="0"/>
               <a:cs typeface="Arial" panose="020B0604020202020204" pitchFamily="34" charset="0"/>
             </a:endParaRPr>
@@ -9089,7 +11526,7 @@
 </p:sld>
 </file>
 
-<file path=ppt/slides/slide3.xml><?xml version="1.0" encoding="utf-8"?>
+<file path=ppt/slides/slide4.xml><?xml version="1.0" encoding="utf-8"?>
 <p:sld xmlns:a="http://schemas.openxmlformats.org/drawingml/2006/main" xmlns:r="http://schemas.openxmlformats.org/officeDocument/2006/relationships" xmlns:p="http://schemas.openxmlformats.org/presentationml/2006/main">
   <p:cSld>
     <p:spTree>
@@ -9725,7 +12162,7 @@
 </p:sld>
 </file>
 
-<file path=ppt/slides/slide4.xml><?xml version="1.0" encoding="utf-8"?>
+<file path=ppt/slides/slide5.xml><?xml version="1.0" encoding="utf-8"?>
 <p:sld xmlns:a="http://schemas.openxmlformats.org/drawingml/2006/main" xmlns:r="http://schemas.openxmlformats.org/officeDocument/2006/relationships" xmlns:p="http://schemas.openxmlformats.org/presentationml/2006/main">
   <p:cSld>
     <p:spTree>
@@ -10056,7 +12493,7 @@
 </p:sld>
 </file>
 
-<file path=ppt/slides/slide5.xml><?xml version="1.0" encoding="utf-8"?>
+<file path=ppt/slides/slide6.xml><?xml version="1.0" encoding="utf-8"?>
 <p:sld xmlns:a="http://schemas.openxmlformats.org/drawingml/2006/main" xmlns:r="http://schemas.openxmlformats.org/officeDocument/2006/relationships" xmlns:p="http://schemas.openxmlformats.org/presentationml/2006/main">
   <p:cSld>
     <p:spTree>
@@ -10575,7 +13012,7 @@
 </p:sld>
 </file>
 
-<file path=ppt/slides/slide6.xml><?xml version="1.0" encoding="utf-8"?>
+<file path=ppt/slides/slide7.xml><?xml version="1.0" encoding="utf-8"?>
 <p:sld xmlns:a="http://schemas.openxmlformats.org/drawingml/2006/main" xmlns:r="http://schemas.openxmlformats.org/officeDocument/2006/relationships" xmlns:p="http://schemas.openxmlformats.org/presentationml/2006/main">
   <p:cSld>
     <p:spTree>
@@ -11083,7 +13520,7 @@
 </p:sld>
 </file>
 
-<file path=ppt/slides/slide7.xml><?xml version="1.0" encoding="utf-8"?>
+<file path=ppt/slides/slide8.xml><?xml version="1.0" encoding="utf-8"?>
 <p:sld xmlns:a="http://schemas.openxmlformats.org/drawingml/2006/main" xmlns:r="http://schemas.openxmlformats.org/officeDocument/2006/relationships" xmlns:p="http://schemas.openxmlformats.org/presentationml/2006/main">
   <p:cSld>
     <p:spTree>
@@ -11436,7 +13873,7 @@
 </p:sld>
 </file>
 
-<file path=ppt/slides/slide8.xml><?xml version="1.0" encoding="utf-8"?>
+<file path=ppt/slides/slide9.xml><?xml version="1.0" encoding="utf-8"?>
 <p:sld xmlns:a="http://schemas.openxmlformats.org/drawingml/2006/main" xmlns:r="http://schemas.openxmlformats.org/officeDocument/2006/relationships" xmlns:p="http://schemas.openxmlformats.org/presentationml/2006/main">
   <p:cSld>
     <p:spTree>
@@ -11462,7 +13899,7 @@
           <p:nvPr/>
         </p:nvPicPr>
         <p:blipFill>
-          <a:blip r:embed="rId2">
+          <a:blip r:embed="rId3">
             <a:extLst>
               <a:ext uri="{28A0092B-C50C-407E-A947-70E740481C1C}">
                 <a14:useLocalDpi xmlns:a14="http://schemas.microsoft.com/office/drawing/2010/main" val="0"/>
@@ -11710,7 +14147,7 @@
           <p:nvPr/>
         </p:nvPicPr>
         <p:blipFill>
-          <a:blip r:embed="rId3">
+          <a:blip r:embed="rId4">
             <a:extLst>
               <a:ext uri="{28A0092B-C50C-407E-A947-70E740481C1C}">
                 <a14:useLocalDpi xmlns:a14="http://schemas.microsoft.com/office/drawing/2010/main" val="0"/>
@@ -11975,360 +14412,6 @@
     <p:bldLst>
       <p:bldP spid="8" grpId="0" animBg="1"/>
     </p:bldLst>
-  </p:timing>
-</p:sld>
-</file>
-
-<file path=ppt/slides/slide9.xml><?xml version="1.0" encoding="utf-8"?>
-<p:sld xmlns:a="http://schemas.openxmlformats.org/drawingml/2006/main" xmlns:r="http://schemas.openxmlformats.org/officeDocument/2006/relationships" xmlns:p="http://schemas.openxmlformats.org/presentationml/2006/main">
-  <p:cSld>
-    <p:spTree>
-      <p:nvGrpSpPr>
-        <p:cNvPr id="1" name=""/>
-        <p:cNvGrpSpPr/>
-        <p:nvPr/>
-      </p:nvGrpSpPr>
-      <p:grpSpPr>
-        <a:xfrm>
-          <a:off x="0" y="0"/>
-          <a:ext cx="0" cy="0"/>
-          <a:chOff x="0" y="0"/>
-          <a:chExt cx="0" cy="0"/>
-        </a:xfrm>
-      </p:grpSpPr>
-      <p:sp>
-        <p:nvSpPr>
-          <p:cNvPr id="2" name="Title 1"/>
-          <p:cNvSpPr txBox="1">
-            <a:spLocks/>
-          </p:cNvSpPr>
-          <p:nvPr/>
-        </p:nvSpPr>
-        <p:spPr>
-          <a:xfrm>
-            <a:off x="641350" y="830263"/>
-            <a:ext cx="13360400" cy="1747837"/>
-          </a:xfrm>
-          <a:prstGeom prst="rect">
-            <a:avLst/>
-          </a:prstGeom>
-        </p:spPr>
-        <p:txBody>
-          <a:bodyPr/>
-          <a:lstStyle>
-            <a:lvl1pPr algn="ctr" rtl="0" eaLnBrk="0" fontAlgn="base" hangingPunct="0">
-              <a:spcBef>
-                <a:spcPct val="0"/>
-              </a:spcBef>
-              <a:spcAft>
-                <a:spcPct val="0"/>
-              </a:spcAft>
-              <a:defRPr sz="4400" kern="1200">
-                <a:solidFill>
-                  <a:schemeClr val="tx1"/>
-                </a:solidFill>
-                <a:latin typeface="+mj-lt"/>
-                <a:ea typeface="+mj-ea"/>
-                <a:cs typeface="+mj-cs"/>
-              </a:defRPr>
-            </a:lvl1pPr>
-            <a:lvl2pPr algn="ctr" rtl="0" eaLnBrk="0" fontAlgn="base" hangingPunct="0">
-              <a:spcBef>
-                <a:spcPct val="0"/>
-              </a:spcBef>
-              <a:spcAft>
-                <a:spcPct val="0"/>
-              </a:spcAft>
-              <a:defRPr sz="4400">
-                <a:solidFill>
-                  <a:schemeClr val="tx1"/>
-                </a:solidFill>
-                <a:latin typeface="Calibri" pitchFamily="34" charset="0"/>
-              </a:defRPr>
-            </a:lvl2pPr>
-            <a:lvl3pPr algn="ctr" rtl="0" eaLnBrk="0" fontAlgn="base" hangingPunct="0">
-              <a:spcBef>
-                <a:spcPct val="0"/>
-              </a:spcBef>
-              <a:spcAft>
-                <a:spcPct val="0"/>
-              </a:spcAft>
-              <a:defRPr sz="4400">
-                <a:solidFill>
-                  <a:schemeClr val="tx1"/>
-                </a:solidFill>
-                <a:latin typeface="Calibri" pitchFamily="34" charset="0"/>
-              </a:defRPr>
-            </a:lvl3pPr>
-            <a:lvl4pPr algn="ctr" rtl="0" eaLnBrk="0" fontAlgn="base" hangingPunct="0">
-              <a:spcBef>
-                <a:spcPct val="0"/>
-              </a:spcBef>
-              <a:spcAft>
-                <a:spcPct val="0"/>
-              </a:spcAft>
-              <a:defRPr sz="4400">
-                <a:solidFill>
-                  <a:schemeClr val="tx1"/>
-                </a:solidFill>
-                <a:latin typeface="Calibri" pitchFamily="34" charset="0"/>
-              </a:defRPr>
-            </a:lvl4pPr>
-            <a:lvl5pPr algn="ctr" rtl="0" eaLnBrk="0" fontAlgn="base" hangingPunct="0">
-              <a:spcBef>
-                <a:spcPct val="0"/>
-              </a:spcBef>
-              <a:spcAft>
-                <a:spcPct val="0"/>
-              </a:spcAft>
-              <a:defRPr sz="4400">
-                <a:solidFill>
-                  <a:schemeClr val="tx1"/>
-                </a:solidFill>
-                <a:latin typeface="Calibri" pitchFamily="34" charset="0"/>
-              </a:defRPr>
-            </a:lvl5pPr>
-            <a:lvl6pPr marL="457200" algn="ctr" rtl="0" fontAlgn="base">
-              <a:spcBef>
-                <a:spcPct val="0"/>
-              </a:spcBef>
-              <a:spcAft>
-                <a:spcPct val="0"/>
-              </a:spcAft>
-              <a:defRPr sz="4400">
-                <a:solidFill>
-                  <a:schemeClr val="tx1"/>
-                </a:solidFill>
-                <a:latin typeface="Calibri" pitchFamily="34" charset="0"/>
-              </a:defRPr>
-            </a:lvl6pPr>
-            <a:lvl7pPr marL="914400" algn="ctr" rtl="0" fontAlgn="base">
-              <a:spcBef>
-                <a:spcPct val="0"/>
-              </a:spcBef>
-              <a:spcAft>
-                <a:spcPct val="0"/>
-              </a:spcAft>
-              <a:defRPr sz="4400">
-                <a:solidFill>
-                  <a:schemeClr val="tx1"/>
-                </a:solidFill>
-                <a:latin typeface="Calibri" pitchFamily="34" charset="0"/>
-              </a:defRPr>
-            </a:lvl7pPr>
-            <a:lvl8pPr marL="1371600" algn="ctr" rtl="0" fontAlgn="base">
-              <a:spcBef>
-                <a:spcPct val="0"/>
-              </a:spcBef>
-              <a:spcAft>
-                <a:spcPct val="0"/>
-              </a:spcAft>
-              <a:defRPr sz="4400">
-                <a:solidFill>
-                  <a:schemeClr val="tx1"/>
-                </a:solidFill>
-                <a:latin typeface="Calibri" pitchFamily="34" charset="0"/>
-              </a:defRPr>
-            </a:lvl8pPr>
-            <a:lvl9pPr marL="1828800" algn="ctr" rtl="0" fontAlgn="base">
-              <a:spcBef>
-                <a:spcPct val="0"/>
-              </a:spcBef>
-              <a:spcAft>
-                <a:spcPct val="0"/>
-              </a:spcAft>
-              <a:defRPr sz="4400">
-                <a:solidFill>
-                  <a:schemeClr val="tx1"/>
-                </a:solidFill>
-                <a:latin typeface="Calibri" pitchFamily="34" charset="0"/>
-              </a:defRPr>
-            </a:lvl9pPr>
-          </a:lstStyle>
-          <a:p>
-            <a:pPr algn="l">
-              <a:defRPr/>
-            </a:pPr>
-            <a:r>
-              <a:rPr lang="en-US" sz="5400" spc="600" dirty="0" smtClean="0">
-                <a:latin typeface="Arial" charset="0"/>
-                <a:cs typeface="Arial" charset="0"/>
-              </a:rPr>
-              <a:t>Subjective Measures</a:t>
-            </a:r>
-            <a:endParaRPr lang="vi-VN" sz="5400" spc="600" dirty="0" smtClean="0">
-              <a:latin typeface="Arial" charset="0"/>
-              <a:cs typeface="Arial" charset="0"/>
-            </a:endParaRPr>
-          </a:p>
-        </p:txBody>
-      </p:sp>
-      <p:pic>
-        <p:nvPicPr>
-          <p:cNvPr id="16387" name="Picture 4"/>
-          <p:cNvPicPr>
-            <a:picLocks noChangeAspect="1"/>
-          </p:cNvPicPr>
-          <p:nvPr/>
-        </p:nvPicPr>
-        <p:blipFill>
-          <a:blip r:embed="rId3">
-            <a:extLst>
-              <a:ext uri="{28A0092B-C50C-407E-A947-70E740481C1C}">
-                <a14:useLocalDpi xmlns:a14="http://schemas.microsoft.com/office/drawing/2010/main" val="0"/>
-              </a:ext>
-            </a:extLst>
-          </a:blip>
-          <a:srcRect/>
-          <a:stretch>
-            <a:fillRect/>
-          </a:stretch>
-        </p:blipFill>
-        <p:spPr bwMode="auto">
-          <a:xfrm>
-            <a:off x="520700" y="1843088"/>
-            <a:ext cx="12846050" cy="441325"/>
-          </a:xfrm>
-          <a:prstGeom prst="rect">
-            <a:avLst/>
-          </a:prstGeom>
-          <a:noFill/>
-          <a:ln>
-            <a:noFill/>
-          </a:ln>
-          <a:extLst>
-            <a:ext uri="{909E8E84-426E-40DD-AFC4-6F175D3DCCD1}">
-              <a14:hiddenFill xmlns:a14="http://schemas.microsoft.com/office/drawing/2010/main">
-                <a:solidFill>
-                  <a:srgbClr val="FFFFFF"/>
-                </a:solidFill>
-              </a14:hiddenFill>
-            </a:ext>
-            <a:ext uri="{91240B29-F687-4F45-9708-019B960494DF}">
-              <a14:hiddenLine xmlns:a14="http://schemas.microsoft.com/office/drawing/2010/main" w="9525">
-                <a:solidFill>
-                  <a:srgbClr val="000000"/>
-                </a:solidFill>
-                <a:miter lim="800000"/>
-                <a:headEnd/>
-                <a:tailEnd/>
-              </a14:hiddenLine>
-            </a:ext>
-          </a:extLst>
-        </p:spPr>
-      </p:pic>
-      <p:sp>
-        <p:nvSpPr>
-          <p:cNvPr id="5" name="Rectangle 4"/>
-          <p:cNvSpPr/>
-          <p:nvPr/>
-        </p:nvSpPr>
-        <p:spPr>
-          <a:xfrm>
-            <a:off x="641350" y="2449513"/>
-            <a:ext cx="13868400" cy="5373687"/>
-          </a:xfrm>
-          <a:prstGeom prst="rect">
-            <a:avLst/>
-          </a:prstGeom>
-        </p:spPr>
-        <p:txBody>
-          <a:bodyPr>
-            <a:spAutoFit/>
-          </a:bodyPr>
-          <a:lstStyle/>
-          <a:p>
-            <a:pPr>
-              <a:lnSpc>
-                <a:spcPct val="150000"/>
-              </a:lnSpc>
-              <a:spcBef>
-                <a:spcPct val="30000"/>
-              </a:spcBef>
-              <a:defRPr/>
-            </a:pPr>
-            <a:r>
-              <a:rPr lang="en-US" sz="4400" dirty="0">
-                <a:cs typeface="Arial" charset="0"/>
-              </a:rPr>
-              <a:t>Definition: an opinion quantified by using a rating scale</a:t>
-            </a:r>
-          </a:p>
-          <a:p>
-            <a:pPr marL="571500" indent="-571500" eaLnBrk="1" hangingPunct="1">
-              <a:lnSpc>
-                <a:spcPct val="150000"/>
-              </a:lnSpc>
-              <a:buFont typeface="Arial" pitchFamily="34" charset="0"/>
-              <a:buChar char="•"/>
-              <a:defRPr/>
-            </a:pPr>
-            <a:r>
-              <a:rPr lang="en-US" sz="4400" dirty="0">
-                <a:cs typeface="Arial" charset="0"/>
-              </a:rPr>
-              <a:t>Customer Satisfaction</a:t>
-            </a:r>
-          </a:p>
-          <a:p>
-            <a:pPr marL="571500" indent="-571500" eaLnBrk="1" hangingPunct="1">
-              <a:lnSpc>
-                <a:spcPct val="150000"/>
-              </a:lnSpc>
-              <a:buFont typeface="Arial" pitchFamily="34" charset="0"/>
-              <a:buChar char="•"/>
-              <a:defRPr/>
-            </a:pPr>
-            <a:r>
-              <a:rPr lang="en-US" sz="4400" dirty="0">
-                <a:cs typeface="Arial" charset="0"/>
-              </a:rPr>
-              <a:t>User Opinion</a:t>
-            </a:r>
-          </a:p>
-          <a:p>
-            <a:pPr>
-              <a:lnSpc>
-                <a:spcPct val="150000"/>
-              </a:lnSpc>
-              <a:spcBef>
-                <a:spcPct val="30000"/>
-              </a:spcBef>
-              <a:defRPr/>
-            </a:pPr>
-            <a:r>
-              <a:rPr lang="en-US" sz="4400" dirty="0">
-                <a:cs typeface="Arial" charset="0"/>
-              </a:rPr>
-              <a:t>- Measure customer satisfaction or user opinion at </a:t>
-            </a:r>
-            <a:r>
-              <a:rPr lang="en-US" sz="4400" b="1" dirty="0">
-                <a:cs typeface="Arial" charset="0"/>
-              </a:rPr>
-              <a:t>key point </a:t>
-            </a:r>
-            <a:r>
-              <a:rPr lang="en-US" sz="4400" dirty="0">
-                <a:cs typeface="Arial" charset="0"/>
-              </a:rPr>
-              <a:t>during the project, not just at the end!</a:t>
-            </a:r>
-          </a:p>
-        </p:txBody>
-      </p:sp>
-    </p:spTree>
-  </p:cSld>
-  <p:clrMapOvr>
-    <a:masterClrMapping/>
-  </p:clrMapOvr>
-  <p:transition spd="slow"/>
-  <p:timing>
-    <p:tnLst>
-      <p:par>
-        <p:cTn id="1" dur="indefinite" restart="never" nodeType="tmRoot"/>
-      </p:par>
-    </p:tnLst>
   </p:timing>
 </p:sld>
 </file>

</xml_diff>